<commit_message>
Made emissivity model slides
</commit_message>
<xml_diff>
--- a/presentation/REU Presentation (2024) template.pptx
+++ b/presentation/REU Presentation (2024) template.pptx
@@ -6,7 +6,7 @@
     <p:sldMasterId id="2147483661" r:id="rId2"/>
   </p:sldMasterIdLst>
   <p:notesMasterIdLst>
-    <p:notesMasterId r:id="rId24"/>
+    <p:notesMasterId r:id="rId27"/>
   </p:notesMasterIdLst>
   <p:sldIdLst>
     <p:sldId id="256" r:id="rId3"/>
@@ -14,22 +14,25 @@
     <p:sldId id="263" r:id="rId5"/>
     <p:sldId id="258" r:id="rId6"/>
     <p:sldId id="264" r:id="rId7"/>
-    <p:sldId id="265" r:id="rId8"/>
-    <p:sldId id="266" r:id="rId9"/>
-    <p:sldId id="268" r:id="rId10"/>
-    <p:sldId id="267" r:id="rId11"/>
-    <p:sldId id="269" r:id="rId12"/>
-    <p:sldId id="270" r:id="rId13"/>
-    <p:sldId id="272" r:id="rId14"/>
-    <p:sldId id="275" r:id="rId15"/>
-    <p:sldId id="274" r:id="rId16"/>
-    <p:sldId id="276" r:id="rId17"/>
-    <p:sldId id="277" r:id="rId18"/>
-    <p:sldId id="279" r:id="rId19"/>
-    <p:sldId id="280" r:id="rId20"/>
-    <p:sldId id="281" r:id="rId21"/>
-    <p:sldId id="283" r:id="rId22"/>
-    <p:sldId id="282" r:id="rId23"/>
+    <p:sldId id="266" r:id="rId8"/>
+    <p:sldId id="284" r:id="rId9"/>
+    <p:sldId id="269" r:id="rId10"/>
+    <p:sldId id="270" r:id="rId11"/>
+    <p:sldId id="272" r:id="rId12"/>
+    <p:sldId id="275" r:id="rId13"/>
+    <p:sldId id="274" r:id="rId14"/>
+    <p:sldId id="276" r:id="rId15"/>
+    <p:sldId id="277" r:id="rId16"/>
+    <p:sldId id="279" r:id="rId17"/>
+    <p:sldId id="280" r:id="rId18"/>
+    <p:sldId id="281" r:id="rId19"/>
+    <p:sldId id="283" r:id="rId20"/>
+    <p:sldId id="286" r:id="rId21"/>
+    <p:sldId id="285" r:id="rId22"/>
+    <p:sldId id="287" r:id="rId23"/>
+    <p:sldId id="288" r:id="rId24"/>
+    <p:sldId id="289" r:id="rId25"/>
+    <p:sldId id="282" r:id="rId26"/>
   </p:sldIdLst>
   <p:sldSz cx="24384000" cy="13716000"/>
   <p:notesSz cx="6858000" cy="9144000"/>
@@ -530,6 +533,144 @@
 </p:notesMaster>
 </file>
 
+<file path=ppt/notesSlides/notesSlide1.xml><?xml version="1.0" encoding="utf-8"?>
+<p:notes xmlns:a="http://schemas.openxmlformats.org/drawingml/2006/main" xmlns:r="http://schemas.openxmlformats.org/officeDocument/2006/relationships" xmlns:p="http://schemas.openxmlformats.org/presentationml/2006/main">
+  <p:cSld>
+    <p:spTree>
+      <p:nvGrpSpPr>
+        <p:cNvPr id="1" name=""/>
+        <p:cNvGrpSpPr/>
+        <p:nvPr/>
+      </p:nvGrpSpPr>
+      <p:grpSpPr>
+        <a:xfrm>
+          <a:off x="0" y="0"/>
+          <a:ext cx="0" cy="0"/>
+          <a:chOff x="0" y="0"/>
+          <a:chExt cx="0" cy="0"/>
+        </a:xfrm>
+      </p:grpSpPr>
+      <p:sp>
+        <p:nvSpPr>
+          <p:cNvPr id="2" name="Slide Image Placeholder 1"/>
+          <p:cNvSpPr>
+            <a:spLocks noGrp="1" noRot="1" noChangeAspect="1"/>
+          </p:cNvSpPr>
+          <p:nvPr>
+            <p:ph type="sldImg"/>
+          </p:nvPr>
+        </p:nvSpPr>
+        <p:spPr>
+          <a:xfrm>
+            <a:off x="381000" y="685800"/>
+            <a:ext cx="6096000" cy="3429000"/>
+          </a:xfrm>
+        </p:spPr>
+      </p:sp>
+      <p:sp>
+        <p:nvSpPr>
+          <p:cNvPr id="3" name="Notes Placeholder 2"/>
+          <p:cNvSpPr>
+            <a:spLocks noGrp="1"/>
+          </p:cNvSpPr>
+          <p:nvPr>
+            <p:ph type="body" idx="1"/>
+          </p:nvPr>
+        </p:nvSpPr>
+        <p:spPr/>
+        <p:txBody>
+          <a:bodyPr/>
+          <a:lstStyle/>
+          <a:p>
+            <a:r>
+              <a:rPr lang="en-US" dirty="0"/>
+              <a:t>Everything needs to be either constant, wavelength, or fitting parameter – so we need a function form for emissivity</a:t>
+            </a:r>
+          </a:p>
+        </p:txBody>
+      </p:sp>
+    </p:spTree>
+    <p:extLst>
+      <p:ext uri="{BB962C8B-B14F-4D97-AF65-F5344CB8AC3E}">
+        <p14:creationId xmlns:p14="http://schemas.microsoft.com/office/powerpoint/2010/main" val="212406378"/>
+      </p:ext>
+    </p:extLst>
+  </p:cSld>
+  <p:clrMapOvr>
+    <a:masterClrMapping/>
+  </p:clrMapOvr>
+</p:notes>
+</file>
+
+<file path=ppt/notesSlides/notesSlide2.xml><?xml version="1.0" encoding="utf-8"?>
+<p:notes xmlns:a="http://schemas.openxmlformats.org/drawingml/2006/main" xmlns:r="http://schemas.openxmlformats.org/officeDocument/2006/relationships" xmlns:p="http://schemas.openxmlformats.org/presentationml/2006/main">
+  <p:cSld>
+    <p:spTree>
+      <p:nvGrpSpPr>
+        <p:cNvPr id="1" name=""/>
+        <p:cNvGrpSpPr/>
+        <p:nvPr/>
+      </p:nvGrpSpPr>
+      <p:grpSpPr>
+        <a:xfrm>
+          <a:off x="0" y="0"/>
+          <a:ext cx="0" cy="0"/>
+          <a:chOff x="0" y="0"/>
+          <a:chExt cx="0" cy="0"/>
+        </a:xfrm>
+      </p:grpSpPr>
+      <p:sp>
+        <p:nvSpPr>
+          <p:cNvPr id="2" name="Slide Image Placeholder 1"/>
+          <p:cNvSpPr>
+            <a:spLocks noGrp="1" noRot="1" noChangeAspect="1"/>
+          </p:cNvSpPr>
+          <p:nvPr>
+            <p:ph type="sldImg"/>
+          </p:nvPr>
+        </p:nvSpPr>
+        <p:spPr>
+          <a:xfrm>
+            <a:off x="381000" y="685800"/>
+            <a:ext cx="6096000" cy="3429000"/>
+          </a:xfrm>
+        </p:spPr>
+      </p:sp>
+      <p:sp>
+        <p:nvSpPr>
+          <p:cNvPr id="3" name="Notes Placeholder 2"/>
+          <p:cNvSpPr>
+            <a:spLocks noGrp="1"/>
+          </p:cNvSpPr>
+          <p:nvPr>
+            <p:ph type="body" idx="1"/>
+          </p:nvPr>
+        </p:nvSpPr>
+        <p:spPr/>
+        <p:txBody>
+          <a:bodyPr/>
+          <a:lstStyle/>
+          <a:p>
+            <a:r>
+              <a:rPr lang="en-US" dirty="0"/>
+              <a:t>Everything needs to be either constant, wavelength, or fitting parameter – so we need a function form for emissivity</a:t>
+            </a:r>
+          </a:p>
+        </p:txBody>
+      </p:sp>
+    </p:spTree>
+    <p:extLst>
+      <p:ext uri="{BB962C8B-B14F-4D97-AF65-F5344CB8AC3E}">
+        <p14:creationId xmlns:p14="http://schemas.microsoft.com/office/powerpoint/2010/main" val="77110887"/>
+      </p:ext>
+    </p:extLst>
+  </p:cSld>
+  <p:clrMapOvr>
+    <a:masterClrMapping/>
+  </p:clrMapOvr>
+</p:notes>
+</file>
+
 <file path=ppt/slideLayouts/slideLayout1.xml><?xml version="1.0" encoding="utf-8"?>
 <p:sldLayout xmlns:a="http://schemas.openxmlformats.org/drawingml/2006/main" xmlns:r="http://schemas.openxmlformats.org/officeDocument/2006/relationships" xmlns:p="http://schemas.openxmlformats.org/presentationml/2006/main" type="title">
   <p:cSld name="Title &amp; Subtitle">
@@ -1266,10 +1407,6 @@
           <a:bodyPr/>
           <a:lstStyle/>
           <a:p>
-            <a:fld id="{01A2A0F2-F2BB-D64C-83A7-9C57C498771B}" type="datetimeFigureOut">
-              <a:rPr lang="en-US" smtClean="0"/>
-              <a:t>7/1/24</a:t>
-            </a:fld>
             <a:endParaRPr lang="en-US"/>
           </a:p>
         </p:txBody>
@@ -1464,10 +1601,6 @@
           <a:bodyPr/>
           <a:lstStyle/>
           <a:p>
-            <a:fld id="{01A2A0F2-F2BB-D64C-83A7-9C57C498771B}" type="datetimeFigureOut">
-              <a:rPr lang="en-US" smtClean="0"/>
-              <a:t>7/1/24</a:t>
-            </a:fld>
             <a:endParaRPr lang="en-US"/>
           </a:p>
         </p:txBody>
@@ -1739,10 +1872,6 @@
           <a:bodyPr/>
           <a:lstStyle/>
           <a:p>
-            <a:fld id="{01A2A0F2-F2BB-D64C-83A7-9C57C498771B}" type="datetimeFigureOut">
-              <a:rPr lang="en-US" smtClean="0"/>
-              <a:t>7/1/24</a:t>
-            </a:fld>
             <a:endParaRPr lang="en-US"/>
           </a:p>
         </p:txBody>
@@ -2004,10 +2133,6 @@
           <a:bodyPr/>
           <a:lstStyle/>
           <a:p>
-            <a:fld id="{01A2A0F2-F2BB-D64C-83A7-9C57C498771B}" type="datetimeFigureOut">
-              <a:rPr lang="en-US" smtClean="0"/>
-              <a:t>7/1/24</a:t>
-            </a:fld>
             <a:endParaRPr lang="en-US"/>
           </a:p>
         </p:txBody>
@@ -2416,10 +2541,6 @@
           <a:bodyPr/>
           <a:lstStyle/>
           <a:p>
-            <a:fld id="{01A2A0F2-F2BB-D64C-83A7-9C57C498771B}" type="datetimeFigureOut">
-              <a:rPr lang="en-US" smtClean="0"/>
-              <a:t>7/1/24</a:t>
-            </a:fld>
             <a:endParaRPr lang="en-US"/>
           </a:p>
         </p:txBody>
@@ -2557,10 +2678,6 @@
           <a:bodyPr/>
           <a:lstStyle/>
           <a:p>
-            <a:fld id="{01A2A0F2-F2BB-D64C-83A7-9C57C498771B}" type="datetimeFigureOut">
-              <a:rPr lang="en-US" smtClean="0"/>
-              <a:t>7/1/24</a:t>
-            </a:fld>
             <a:endParaRPr lang="en-US"/>
           </a:p>
         </p:txBody>
@@ -2670,10 +2787,6 @@
           <a:bodyPr/>
           <a:lstStyle/>
           <a:p>
-            <a:fld id="{01A2A0F2-F2BB-D64C-83A7-9C57C498771B}" type="datetimeFigureOut">
-              <a:rPr lang="en-US" smtClean="0"/>
-              <a:t>7/1/24</a:t>
-            </a:fld>
             <a:endParaRPr lang="en-US"/>
           </a:p>
         </p:txBody>
@@ -3185,10 +3298,6 @@
           <a:bodyPr/>
           <a:lstStyle/>
           <a:p>
-            <a:fld id="{01A2A0F2-F2BB-D64C-83A7-9C57C498771B}" type="datetimeFigureOut">
-              <a:rPr lang="en-US" smtClean="0"/>
-              <a:t>7/1/24</a:t>
-            </a:fld>
             <a:endParaRPr lang="en-US"/>
           </a:p>
         </p:txBody>
@@ -3473,10 +3582,6 @@
           <a:bodyPr/>
           <a:lstStyle/>
           <a:p>
-            <a:fld id="{01A2A0F2-F2BB-D64C-83A7-9C57C498771B}" type="datetimeFigureOut">
-              <a:rPr lang="en-US" smtClean="0"/>
-              <a:t>7/1/24</a:t>
-            </a:fld>
             <a:endParaRPr lang="en-US"/>
           </a:p>
         </p:txBody>
@@ -3671,10 +3776,6 @@
           <a:bodyPr/>
           <a:lstStyle/>
           <a:p>
-            <a:fld id="{01A2A0F2-F2BB-D64C-83A7-9C57C498771B}" type="datetimeFigureOut">
-              <a:rPr lang="en-US" smtClean="0"/>
-              <a:t>7/1/24</a:t>
-            </a:fld>
             <a:endParaRPr lang="en-US"/>
           </a:p>
         </p:txBody>
@@ -3879,10 +3980,6 @@
           <a:bodyPr/>
           <a:lstStyle/>
           <a:p>
-            <a:fld id="{01A2A0F2-F2BB-D64C-83A7-9C57C498771B}" type="datetimeFigureOut">
-              <a:rPr lang="en-US" smtClean="0"/>
-              <a:t>7/1/24</a:t>
-            </a:fld>
             <a:endParaRPr lang="en-US"/>
           </a:p>
         </p:txBody>
@@ -5106,6 +5203,7 @@
     <p:sldLayoutId id="2147483660" r:id="rId12"/>
   </p:sldLayoutIdLst>
   <p:transition spd="med"/>
+  <p:hf hdr="0" ftr="0" dt="0"/>
   <p:txStyles>
     <p:titleStyle>
       <a:lvl1pPr marL="0" marR="0" indent="0" algn="ctr" defTabSz="825500" rtl="0" latinLnBrk="0">
@@ -5985,10 +6083,6 @@
             </a:lvl1pPr>
           </a:lstStyle>
           <a:p>
-            <a:fld id="{01A2A0F2-F2BB-D64C-83A7-9C57C498771B}" type="datetimeFigureOut">
-              <a:rPr lang="en-US" smtClean="0"/>
-              <a:t>7/1/24</a:t>
-            </a:fld>
             <a:endParaRPr lang="en-US"/>
           </a:p>
         </p:txBody>
@@ -6104,6 +6198,7 @@
     <p:sldLayoutId id="2147483671" r:id="rId10"/>
     <p:sldLayoutId id="2147483672" r:id="rId11"/>
   </p:sldLayoutIdLst>
+  <p:hf hdr="0" ftr="0" dt="0"/>
   <p:txStyles>
     <p:titleStyle>
       <a:lvl1pPr algn="l" defTabSz="914400" rtl="0" eaLnBrk="1" latinLnBrk="0" hangingPunct="1">
@@ -6734,6 +6829,35 @@
           </a:p>
         </p:txBody>
       </p:sp>
+      <p:sp>
+        <p:nvSpPr>
+          <p:cNvPr id="2" name="Slide Number Placeholder 1">
+            <a:extLst>
+              <a:ext uri="{FF2B5EF4-FFF2-40B4-BE49-F238E27FC236}">
+                <a16:creationId xmlns:a16="http://schemas.microsoft.com/office/drawing/2014/main" id="{116854AF-B892-D441-7C4B-7049BF3F3FA5}"/>
+              </a:ext>
+            </a:extLst>
+          </p:cNvPr>
+          <p:cNvSpPr>
+            <a:spLocks noGrp="1"/>
+          </p:cNvSpPr>
+          <p:nvPr>
+            <p:ph type="sldNum" sz="quarter" idx="2"/>
+          </p:nvPr>
+        </p:nvSpPr>
+        <p:spPr/>
+        <p:txBody>
+          <a:bodyPr/>
+          <a:lstStyle/>
+          <a:p>
+            <a:fld id="{86CB4B4D-7CA3-9044-876B-883B54F8677D}" type="slidenum">
+              <a:rPr lang="en-US" smtClean="0"/>
+              <a:t>1</a:t>
+            </a:fld>
+            <a:endParaRPr lang="en-US"/>
+          </a:p>
+        </p:txBody>
+      </p:sp>
     </p:spTree>
   </p:cSld>
   <p:clrMapOvr>
@@ -6828,6 +6952,90 @@
                   <a:noFill/>
                 </a:ln>
                 <a:solidFill>
+                  <a:schemeClr val="bg2">
+                    <a:lumMod val="90000"/>
+                  </a:schemeClr>
+                </a:solidFill>
+                <a:effectLst/>
+                <a:uFillTx/>
+                <a:latin typeface="Helvetica Neue"/>
+                <a:ea typeface="Helvetica Neue"/>
+                <a:cs typeface="Helvetica Neue"/>
+                <a:sym typeface="Helvetica Neue"/>
+              </a:rPr>
+              <a:t>Measuring more than Infrared</a:t>
+            </a:r>
+          </a:p>
+        </p:txBody>
+      </p:sp>
+      <p:sp>
+        <p:nvSpPr>
+          <p:cNvPr id="4" name="TextBox 3">
+            <a:extLst>
+              <a:ext uri="{FF2B5EF4-FFF2-40B4-BE49-F238E27FC236}">
+                <a16:creationId xmlns:a16="http://schemas.microsoft.com/office/drawing/2014/main" id="{E60F9A97-FA66-A5E7-6D61-C1A428C7659A}"/>
+              </a:ext>
+            </a:extLst>
+          </p:cNvPr>
+          <p:cNvSpPr txBox="1"/>
+          <p:nvPr/>
+        </p:nvSpPr>
+        <p:spPr>
+          <a:xfrm>
+            <a:off x="2929749" y="2812473"/>
+            <a:ext cx="18524502" cy="1210588"/>
+          </a:xfrm>
+          <a:prstGeom prst="rect">
+            <a:avLst/>
+          </a:prstGeom>
+          <a:noFill/>
+          <a:ln w="12700" cap="flat">
+            <a:noFill/>
+            <a:miter lim="400000"/>
+          </a:ln>
+          <a:effectLst/>
+          <a:sp3d/>
+        </p:spPr>
+        <p:style>
+          <a:lnRef idx="0">
+            <a:scrgbClr r="0" g="0" b="0"/>
+          </a:lnRef>
+          <a:fillRef idx="0">
+            <a:scrgbClr r="0" g="0" b="0"/>
+          </a:fillRef>
+          <a:effectRef idx="0">
+            <a:scrgbClr r="0" g="0" b="0"/>
+          </a:effectRef>
+          <a:fontRef idx="none"/>
+        </p:style>
+        <p:txBody>
+          <a:bodyPr rot="0" spcFirstLastPara="1" vertOverflow="overflow" horzOverflow="overflow" vert="horz" wrap="square" lIns="50800" tIns="50800" rIns="50800" bIns="50800" numCol="1" spcCol="38100" rtlCol="0" anchor="ctr">
+            <a:spAutoFit/>
+          </a:bodyPr>
+          <a:lstStyle/>
+          <a:p>
+            <a:pPr marL="0" marR="0" indent="0" algn="ctr" defTabSz="825500" rtl="0" fontAlgn="auto" latinLnBrk="0" hangingPunct="0">
+              <a:lnSpc>
+                <a:spcPct val="100000"/>
+              </a:lnSpc>
+              <a:spcBef>
+                <a:spcPts val="0"/>
+              </a:spcBef>
+              <a:spcAft>
+                <a:spcPts val="0"/>
+              </a:spcAft>
+              <a:buClrTx/>
+              <a:buSzTx/>
+              <a:buFontTx/>
+              <a:buNone/>
+              <a:tabLst/>
+            </a:pPr>
+            <a:r>
+              <a:rPr kumimoji="0" lang="en-US" sz="7200" b="1" i="0" u="none" strike="noStrike" cap="none" spc="0" normalizeH="0" baseline="0" dirty="0">
+                <a:ln>
+                  <a:noFill/>
+                </a:ln>
+                <a:solidFill>
                   <a:schemeClr val="bg1"/>
                 </a:solidFill>
                 <a:effectLst/>
@@ -6837,15 +7045,80 @@
                 <a:cs typeface="Helvetica Neue"/>
                 <a:sym typeface="Helvetica Neue"/>
               </a:rPr>
-              <a:t>Measuring more than Infrared</a:t>
-            </a:r>
+              <a:t>Traditional camera</a:t>
+            </a:r>
+          </a:p>
+        </p:txBody>
+      </p:sp>
+      <p:pic>
+        <p:nvPicPr>
+          <p:cNvPr id="6" name="Picture 5" descr="A graph of a number of blue rectangular objects&#10;&#10;Description automatically generated with medium confidence">
+            <a:extLst>
+              <a:ext uri="{FF2B5EF4-FFF2-40B4-BE49-F238E27FC236}">
+                <a16:creationId xmlns:a16="http://schemas.microsoft.com/office/drawing/2014/main" id="{AA094FD9-6407-A44D-E6BC-8A315BFA68DC}"/>
+              </a:ext>
+            </a:extLst>
+          </p:cNvPr>
+          <p:cNvPicPr>
+            <a:picLocks noChangeAspect="1"/>
+          </p:cNvPicPr>
+          <p:nvPr/>
+        </p:nvPicPr>
+        <p:blipFill>
+          <a:blip r:embed="rId2">
+            <a:extLst>
+              <a:ext uri="{28A0092B-C50C-407E-A947-70E740481C1C}">
+                <a14:useLocalDpi xmlns:a14="http://schemas.microsoft.com/office/drawing/2010/main" val="0"/>
+              </a:ext>
+            </a:extLst>
+          </a:blip>
+          <a:stretch>
+            <a:fillRect/>
+          </a:stretch>
+        </p:blipFill>
+        <p:spPr>
+          <a:xfrm>
+            <a:off x="7159690" y="5180268"/>
+            <a:ext cx="10064620" cy="6282164"/>
+          </a:xfrm>
+          <a:prstGeom prst="rect">
+            <a:avLst/>
+          </a:prstGeom>
+        </p:spPr>
+      </p:pic>
+      <p:sp>
+        <p:nvSpPr>
+          <p:cNvPr id="3" name="Slide Number Placeholder 2">
+            <a:extLst>
+              <a:ext uri="{FF2B5EF4-FFF2-40B4-BE49-F238E27FC236}">
+                <a16:creationId xmlns:a16="http://schemas.microsoft.com/office/drawing/2014/main" id="{4757B63C-9797-54FF-140E-D9D7FCC96530}"/>
+              </a:ext>
+            </a:extLst>
+          </p:cNvPr>
+          <p:cNvSpPr>
+            <a:spLocks noGrp="1"/>
+          </p:cNvSpPr>
+          <p:nvPr>
+            <p:ph type="sldNum" sz="quarter" idx="2"/>
+          </p:nvPr>
+        </p:nvSpPr>
+        <p:spPr/>
+        <p:txBody>
+          <a:bodyPr/>
+          <a:lstStyle/>
+          <a:p>
+            <a:fld id="{86CB4B4D-7CA3-9044-876B-883B54F8677D}" type="slidenum">
+              <a:rPr lang="en-US" smtClean="0"/>
+              <a:t>10</a:t>
+            </a:fld>
+            <a:endParaRPr lang="en-US"/>
           </a:p>
         </p:txBody>
       </p:sp>
     </p:spTree>
     <p:extLst>
       <p:ext uri="{BB962C8B-B14F-4D97-AF65-F5344CB8AC3E}">
-        <p14:creationId xmlns:p14="http://schemas.microsoft.com/office/powerpoint/2010/main" val="1338275189"/>
+        <p14:creationId xmlns:p14="http://schemas.microsoft.com/office/powerpoint/2010/main" val="2022514516"/>
       </p:ext>
     </p:extLst>
   </p:cSld>
@@ -6957,6 +7230,36 @@
           </a:p>
         </p:txBody>
       </p:sp>
+      <p:pic>
+        <p:nvPicPr>
+          <p:cNvPr id="3" name="Picture 2">
+            <a:extLst>
+              <a:ext uri="{FF2B5EF4-FFF2-40B4-BE49-F238E27FC236}">
+                <a16:creationId xmlns:a16="http://schemas.microsoft.com/office/drawing/2014/main" id="{788BE0B1-505C-677C-BB46-1EACDA349126}"/>
+              </a:ext>
+            </a:extLst>
+          </p:cNvPr>
+          <p:cNvPicPr>
+            <a:picLocks noChangeAspect="1"/>
+          </p:cNvPicPr>
+          <p:nvPr/>
+        </p:nvPicPr>
+        <p:blipFill>
+          <a:blip r:embed="rId2"/>
+          <a:stretch>
+            <a:fillRect/>
+          </a:stretch>
+        </p:blipFill>
+        <p:spPr>
+          <a:xfrm>
+            <a:off x="19245443" y="6644825"/>
+            <a:ext cx="2712598" cy="3019937"/>
+          </a:xfrm>
+          <a:prstGeom prst="rect">
+            <a:avLst/>
+          </a:prstGeom>
+        </p:spPr>
+      </p:pic>
       <p:sp>
         <p:nvSpPr>
           <p:cNvPr id="4" name="TextBox 3">
@@ -7039,10 +7342,75 @@
           </a:p>
         </p:txBody>
       </p:sp>
+      <p:pic>
+        <p:nvPicPr>
+          <p:cNvPr id="6" name="Picture 5" descr="A graph of a number of blue rectangular objects&#10;&#10;Description automatically generated with medium confidence">
+            <a:extLst>
+              <a:ext uri="{FF2B5EF4-FFF2-40B4-BE49-F238E27FC236}">
+                <a16:creationId xmlns:a16="http://schemas.microsoft.com/office/drawing/2014/main" id="{AA094FD9-6407-A44D-E6BC-8A315BFA68DC}"/>
+              </a:ext>
+            </a:extLst>
+          </p:cNvPr>
+          <p:cNvPicPr>
+            <a:picLocks noChangeAspect="1"/>
+          </p:cNvPicPr>
+          <p:nvPr/>
+        </p:nvPicPr>
+        <p:blipFill>
+          <a:blip r:embed="rId3">
+            <a:extLst>
+              <a:ext uri="{28A0092B-C50C-407E-A947-70E740481C1C}">
+                <a14:useLocalDpi xmlns:a14="http://schemas.microsoft.com/office/drawing/2010/main" val="0"/>
+              </a:ext>
+            </a:extLst>
+          </a:blip>
+          <a:stretch>
+            <a:fillRect/>
+          </a:stretch>
+        </p:blipFill>
+        <p:spPr>
+          <a:xfrm>
+            <a:off x="7159690" y="5180268"/>
+            <a:ext cx="10064620" cy="6282164"/>
+          </a:xfrm>
+          <a:prstGeom prst="rect">
+            <a:avLst/>
+          </a:prstGeom>
+        </p:spPr>
+      </p:pic>
+      <p:sp>
+        <p:nvSpPr>
+          <p:cNvPr id="5" name="Slide Number Placeholder 4">
+            <a:extLst>
+              <a:ext uri="{FF2B5EF4-FFF2-40B4-BE49-F238E27FC236}">
+                <a16:creationId xmlns:a16="http://schemas.microsoft.com/office/drawing/2014/main" id="{457A2E69-534E-244A-CA2E-688AEBB6E4D2}"/>
+              </a:ext>
+            </a:extLst>
+          </p:cNvPr>
+          <p:cNvSpPr>
+            <a:spLocks noGrp="1"/>
+          </p:cNvSpPr>
+          <p:nvPr>
+            <p:ph type="sldNum" sz="quarter" idx="2"/>
+          </p:nvPr>
+        </p:nvSpPr>
+        <p:spPr/>
+        <p:txBody>
+          <a:bodyPr/>
+          <a:lstStyle/>
+          <a:p>
+            <a:fld id="{86CB4B4D-7CA3-9044-876B-883B54F8677D}" type="slidenum">
+              <a:rPr lang="en-US" smtClean="0"/>
+              <a:t>11</a:t>
+            </a:fld>
+            <a:endParaRPr lang="en-US"/>
+          </a:p>
+        </p:txBody>
+      </p:sp>
     </p:spTree>
     <p:extLst>
       <p:ext uri="{BB962C8B-B14F-4D97-AF65-F5344CB8AC3E}">
-        <p14:creationId xmlns:p14="http://schemas.microsoft.com/office/powerpoint/2010/main" val="424534213"/>
+        <p14:creationId xmlns:p14="http://schemas.microsoft.com/office/powerpoint/2010/main" val="2485235155"/>
       </p:ext>
     </p:extLst>
   </p:cSld>
@@ -7231,17 +7599,17 @@
                 <a:cs typeface="Helvetica Neue"/>
                 <a:sym typeface="Helvetica Neue"/>
               </a:rPr>
-              <a:t>Traditional camera</a:t>
+              <a:t>Hyperspectral camera</a:t>
             </a:r>
           </a:p>
         </p:txBody>
       </p:sp>
       <p:pic>
         <p:nvPicPr>
-          <p:cNvPr id="6" name="Picture 5" descr="A graph of a number of blue rectangular objects&#10;&#10;Description automatically generated with medium confidence">
+          <p:cNvPr id="5" name="Picture 4" descr="A graph of a blue line&#10;&#10;Description automatically generated">
             <a:extLst>
               <a:ext uri="{FF2B5EF4-FFF2-40B4-BE49-F238E27FC236}">
-                <a16:creationId xmlns:a16="http://schemas.microsoft.com/office/drawing/2014/main" id="{AA094FD9-6407-A44D-E6BC-8A315BFA68DC}"/>
+                <a16:creationId xmlns:a16="http://schemas.microsoft.com/office/drawing/2014/main" id="{6E4DBA47-FD3B-4F4F-D8DE-FAD56D139A80}"/>
               </a:ext>
             </a:extLst>
           </p:cNvPr>
@@ -7264,18 +7632,47 @@
         </p:blipFill>
         <p:spPr>
           <a:xfrm>
-            <a:off x="7159690" y="5180268"/>
-            <a:ext cx="10064620" cy="6282164"/>
+            <a:off x="6920942" y="4676050"/>
+            <a:ext cx="10542116" cy="6819264"/>
           </a:xfrm>
           <a:prstGeom prst="rect">
             <a:avLst/>
           </a:prstGeom>
         </p:spPr>
       </p:pic>
+      <p:sp>
+        <p:nvSpPr>
+          <p:cNvPr id="3" name="Slide Number Placeholder 2">
+            <a:extLst>
+              <a:ext uri="{FF2B5EF4-FFF2-40B4-BE49-F238E27FC236}">
+                <a16:creationId xmlns:a16="http://schemas.microsoft.com/office/drawing/2014/main" id="{3B10C7B5-1367-4E63-8AAD-BC0412B17A0F}"/>
+              </a:ext>
+            </a:extLst>
+          </p:cNvPr>
+          <p:cNvSpPr>
+            <a:spLocks noGrp="1"/>
+          </p:cNvSpPr>
+          <p:nvPr>
+            <p:ph type="sldNum" sz="quarter" idx="2"/>
+          </p:nvPr>
+        </p:nvSpPr>
+        <p:spPr/>
+        <p:txBody>
+          <a:bodyPr/>
+          <a:lstStyle/>
+          <a:p>
+            <a:fld id="{86CB4B4D-7CA3-9044-876B-883B54F8677D}" type="slidenum">
+              <a:rPr lang="en-US" smtClean="0"/>
+              <a:t>12</a:t>
+            </a:fld>
+            <a:endParaRPr lang="en-US"/>
+          </a:p>
+        </p:txBody>
+      </p:sp>
     </p:spTree>
     <p:extLst>
       <p:ext uri="{BB962C8B-B14F-4D97-AF65-F5344CB8AC3E}">
-        <p14:creationId xmlns:p14="http://schemas.microsoft.com/office/powerpoint/2010/main" val="2022514516"/>
+        <p14:creationId xmlns:p14="http://schemas.microsoft.com/office/powerpoint/2010/main" val="68624014"/>
       </p:ext>
     </p:extLst>
   </p:cSld>
@@ -7387,36 +7784,6 @@
           </a:p>
         </p:txBody>
       </p:sp>
-      <p:pic>
-        <p:nvPicPr>
-          <p:cNvPr id="3" name="Picture 2">
-            <a:extLst>
-              <a:ext uri="{FF2B5EF4-FFF2-40B4-BE49-F238E27FC236}">
-                <a16:creationId xmlns:a16="http://schemas.microsoft.com/office/drawing/2014/main" id="{788BE0B1-505C-677C-BB46-1EACDA349126}"/>
-              </a:ext>
-            </a:extLst>
-          </p:cNvPr>
-          <p:cNvPicPr>
-            <a:picLocks noChangeAspect="1"/>
-          </p:cNvPicPr>
-          <p:nvPr/>
-        </p:nvPicPr>
-        <p:blipFill>
-          <a:blip r:embed="rId2"/>
-          <a:stretch>
-            <a:fillRect/>
-          </a:stretch>
-        </p:blipFill>
-        <p:spPr>
-          <a:xfrm>
-            <a:off x="19245443" y="6644825"/>
-            <a:ext cx="2712598" cy="3019937"/>
-          </a:xfrm>
-          <a:prstGeom prst="rect">
-            <a:avLst/>
-          </a:prstGeom>
-        </p:spPr>
-      </p:pic>
       <p:sp>
         <p:nvSpPr>
           <p:cNvPr id="4" name="TextBox 3">
@@ -7494,17 +7861,17 @@
                 <a:cs typeface="Helvetica Neue"/>
                 <a:sym typeface="Helvetica Neue"/>
               </a:rPr>
-              <a:t>Traditional camera</a:t>
+              <a:t>Hyperspectral camera</a:t>
             </a:r>
           </a:p>
         </p:txBody>
       </p:sp>
       <p:pic>
         <p:nvPicPr>
-          <p:cNvPr id="6" name="Picture 5" descr="A graph of a number of blue rectangular objects&#10;&#10;Description automatically generated with medium confidence">
+          <p:cNvPr id="7" name="Picture 6" descr="A graph of a wave&#10;&#10;Description automatically generated">
             <a:extLst>
               <a:ext uri="{FF2B5EF4-FFF2-40B4-BE49-F238E27FC236}">
-                <a16:creationId xmlns:a16="http://schemas.microsoft.com/office/drawing/2014/main" id="{AA094FD9-6407-A44D-E6BC-8A315BFA68DC}"/>
+                <a16:creationId xmlns:a16="http://schemas.microsoft.com/office/drawing/2014/main" id="{3D0B9264-FE6C-9987-EAFA-0892C704AB30}"/>
               </a:ext>
             </a:extLst>
           </p:cNvPr>
@@ -7514,7 +7881,7 @@
           <p:nvPr/>
         </p:nvPicPr>
         <p:blipFill>
-          <a:blip r:embed="rId3">
+          <a:blip r:embed="rId2">
             <a:extLst>
               <a:ext uri="{28A0092B-C50C-407E-A947-70E740481C1C}">
                 <a14:useLocalDpi xmlns:a14="http://schemas.microsoft.com/office/drawing/2010/main" val="0"/>
@@ -7527,18 +7894,47 @@
         </p:blipFill>
         <p:spPr>
           <a:xfrm>
-            <a:off x="7159690" y="5180268"/>
-            <a:ext cx="10064620" cy="6282164"/>
+            <a:off x="6920942" y="4751200"/>
+            <a:ext cx="10542116" cy="6744114"/>
           </a:xfrm>
           <a:prstGeom prst="rect">
             <a:avLst/>
           </a:prstGeom>
         </p:spPr>
       </p:pic>
+      <p:sp>
+        <p:nvSpPr>
+          <p:cNvPr id="3" name="Slide Number Placeholder 2">
+            <a:extLst>
+              <a:ext uri="{FF2B5EF4-FFF2-40B4-BE49-F238E27FC236}">
+                <a16:creationId xmlns:a16="http://schemas.microsoft.com/office/drawing/2014/main" id="{CAAA0449-F3AC-AD7E-3A99-6F7B327A40C5}"/>
+              </a:ext>
+            </a:extLst>
+          </p:cNvPr>
+          <p:cNvSpPr>
+            <a:spLocks noGrp="1"/>
+          </p:cNvSpPr>
+          <p:nvPr>
+            <p:ph type="sldNum" sz="quarter" idx="2"/>
+          </p:nvPr>
+        </p:nvSpPr>
+        <p:spPr/>
+        <p:txBody>
+          <a:bodyPr/>
+          <a:lstStyle/>
+          <a:p>
+            <a:fld id="{86CB4B4D-7CA3-9044-876B-883B54F8677D}" type="slidenum">
+              <a:rPr lang="en-US" smtClean="0"/>
+              <a:t>13</a:t>
+            </a:fld>
+            <a:endParaRPr lang="en-US"/>
+          </a:p>
+        </p:txBody>
+      </p:sp>
     </p:spTree>
     <p:extLst>
       <p:ext uri="{BB962C8B-B14F-4D97-AF65-F5344CB8AC3E}">
-        <p14:creationId xmlns:p14="http://schemas.microsoft.com/office/powerpoint/2010/main" val="2485235155"/>
+        <p14:creationId xmlns:p14="http://schemas.microsoft.com/office/powerpoint/2010/main" val="3803621524"/>
       </p:ext>
     </p:extLst>
   </p:cSld>
@@ -7734,10 +8130,10 @@
       </p:sp>
       <p:pic>
         <p:nvPicPr>
-          <p:cNvPr id="5" name="Picture 4" descr="A graph of a blue line&#10;&#10;Description automatically generated">
+          <p:cNvPr id="7" name="Picture 6" descr="A graph of a wave&#10;&#10;Description automatically generated">
             <a:extLst>
               <a:ext uri="{FF2B5EF4-FFF2-40B4-BE49-F238E27FC236}">
-                <a16:creationId xmlns:a16="http://schemas.microsoft.com/office/drawing/2014/main" id="{6E4DBA47-FD3B-4F4F-D8DE-FAD56D139A80}"/>
+                <a16:creationId xmlns:a16="http://schemas.microsoft.com/office/drawing/2014/main" id="{3D0B9264-FE6C-9987-EAFA-0892C704AB30}"/>
               </a:ext>
             </a:extLst>
           </p:cNvPr>
@@ -7760,18 +8156,129 @@
         </p:blipFill>
         <p:spPr>
           <a:xfrm>
-            <a:off x="6920942" y="4676050"/>
-            <a:ext cx="10542116" cy="6819264"/>
+            <a:off x="6920942" y="4751200"/>
+            <a:ext cx="10542116" cy="6744114"/>
           </a:xfrm>
           <a:prstGeom prst="rect">
             <a:avLst/>
           </a:prstGeom>
         </p:spPr>
       </p:pic>
+      <p:sp>
+        <p:nvSpPr>
+          <p:cNvPr id="3" name="TextBox 2">
+            <a:extLst>
+              <a:ext uri="{FF2B5EF4-FFF2-40B4-BE49-F238E27FC236}">
+                <a16:creationId xmlns:a16="http://schemas.microsoft.com/office/drawing/2014/main" id="{0CA42D85-2BCE-9959-89DB-43480A92FA92}"/>
+              </a:ext>
+            </a:extLst>
+          </p:cNvPr>
+          <p:cNvSpPr txBox="1"/>
+          <p:nvPr/>
+        </p:nvSpPr>
+        <p:spPr>
+          <a:xfrm>
+            <a:off x="13894484" y="5347153"/>
+            <a:ext cx="2834109" cy="1118255"/>
+          </a:xfrm>
+          <a:prstGeom prst="rect">
+            <a:avLst/>
+          </a:prstGeom>
+          <a:noFill/>
+          <a:ln w="12700" cap="flat">
+            <a:noFill/>
+            <a:miter lim="400000"/>
+          </a:ln>
+          <a:effectLst/>
+          <a:sp3d/>
+        </p:spPr>
+        <p:style>
+          <a:lnRef idx="0">
+            <a:scrgbClr r="0" g="0" b="0"/>
+          </a:lnRef>
+          <a:fillRef idx="0">
+            <a:scrgbClr r="0" g="0" b="0"/>
+          </a:fillRef>
+          <a:effectRef idx="0">
+            <a:scrgbClr r="0" g="0" b="0"/>
+          </a:effectRef>
+          <a:fontRef idx="none"/>
+        </p:style>
+        <p:txBody>
+          <a:bodyPr rot="0" spcFirstLastPara="1" vertOverflow="overflow" horzOverflow="overflow" vert="horz" wrap="none" lIns="50800" tIns="50800" rIns="50800" bIns="50800" numCol="1" spcCol="38100" rtlCol="0" anchor="ctr">
+            <a:spAutoFit/>
+          </a:bodyPr>
+          <a:lstStyle/>
+          <a:p>
+            <a:pPr marL="0" marR="0" indent="0" algn="ctr" defTabSz="825500" rtl="0" fontAlgn="auto" latinLnBrk="0" hangingPunct="0">
+              <a:lnSpc>
+                <a:spcPct val="100000"/>
+              </a:lnSpc>
+              <a:spcBef>
+                <a:spcPts val="0"/>
+              </a:spcBef>
+              <a:spcAft>
+                <a:spcPts val="0"/>
+              </a:spcAft>
+              <a:buClrTx/>
+              <a:buSzTx/>
+              <a:buFontTx/>
+              <a:buNone/>
+              <a:tabLst/>
+            </a:pPr>
+            <a:r>
+              <a:rPr kumimoji="0" lang="en-US" sz="6600" b="1" i="0" u="none" strike="noStrike" cap="none" spc="0" normalizeH="0" baseline="0" dirty="0">
+                <a:ln>
+                  <a:noFill/>
+                </a:ln>
+                <a:solidFill>
+                  <a:srgbClr val="000000"/>
+                </a:solidFill>
+                <a:effectLst/>
+                <a:uFillTx/>
+                <a:latin typeface="Helvetica Neue"/>
+                <a:ea typeface="Helvetica Neue"/>
+                <a:cs typeface="Helvetica Neue"/>
+                <a:sym typeface="Helvetica Neue"/>
+              </a:rPr>
+              <a:t>5500 K</a:t>
+            </a:r>
+          </a:p>
+        </p:txBody>
+      </p:sp>
+      <p:sp>
+        <p:nvSpPr>
+          <p:cNvPr id="5" name="Slide Number Placeholder 4">
+            <a:extLst>
+              <a:ext uri="{FF2B5EF4-FFF2-40B4-BE49-F238E27FC236}">
+                <a16:creationId xmlns:a16="http://schemas.microsoft.com/office/drawing/2014/main" id="{B21F073F-02C8-3B7D-C10E-1736BA20C1F6}"/>
+              </a:ext>
+            </a:extLst>
+          </p:cNvPr>
+          <p:cNvSpPr>
+            <a:spLocks noGrp="1"/>
+          </p:cNvSpPr>
+          <p:nvPr>
+            <p:ph type="sldNum" sz="quarter" idx="2"/>
+          </p:nvPr>
+        </p:nvSpPr>
+        <p:spPr/>
+        <p:txBody>
+          <a:bodyPr/>
+          <a:lstStyle/>
+          <a:p>
+            <a:fld id="{86CB4B4D-7CA3-9044-876B-883B54F8677D}" type="slidenum">
+              <a:rPr lang="en-US" smtClean="0"/>
+              <a:t>14</a:t>
+            </a:fld>
+            <a:endParaRPr lang="en-US"/>
+          </a:p>
+        </p:txBody>
+      </p:sp>
     </p:spTree>
     <p:extLst>
       <p:ext uri="{BB962C8B-B14F-4D97-AF65-F5344CB8AC3E}">
-        <p14:creationId xmlns:p14="http://schemas.microsoft.com/office/powerpoint/2010/main" val="68624014"/>
+        <p14:creationId xmlns:p14="http://schemas.microsoft.com/office/powerpoint/2010/main" val="3501434362"/>
       </p:ext>
     </p:extLst>
   </p:cSld>
@@ -7867,90 +8374,6 @@
                   <a:noFill/>
                 </a:ln>
                 <a:solidFill>
-                  <a:schemeClr val="bg2">
-                    <a:lumMod val="90000"/>
-                  </a:schemeClr>
-                </a:solidFill>
-                <a:effectLst/>
-                <a:uFillTx/>
-                <a:latin typeface="Helvetica Neue"/>
-                <a:ea typeface="Helvetica Neue"/>
-                <a:cs typeface="Helvetica Neue"/>
-                <a:sym typeface="Helvetica Neue"/>
-              </a:rPr>
-              <a:t>Measuring more than Infrared</a:t>
-            </a:r>
-          </a:p>
-        </p:txBody>
-      </p:sp>
-      <p:sp>
-        <p:nvSpPr>
-          <p:cNvPr id="4" name="TextBox 3">
-            <a:extLst>
-              <a:ext uri="{FF2B5EF4-FFF2-40B4-BE49-F238E27FC236}">
-                <a16:creationId xmlns:a16="http://schemas.microsoft.com/office/drawing/2014/main" id="{E60F9A97-FA66-A5E7-6D61-C1A428C7659A}"/>
-              </a:ext>
-            </a:extLst>
-          </p:cNvPr>
-          <p:cNvSpPr txBox="1"/>
-          <p:nvPr/>
-        </p:nvSpPr>
-        <p:spPr>
-          <a:xfrm>
-            <a:off x="2929749" y="2812473"/>
-            <a:ext cx="18524502" cy="1210588"/>
-          </a:xfrm>
-          <a:prstGeom prst="rect">
-            <a:avLst/>
-          </a:prstGeom>
-          <a:noFill/>
-          <a:ln w="12700" cap="flat">
-            <a:noFill/>
-            <a:miter lim="400000"/>
-          </a:ln>
-          <a:effectLst/>
-          <a:sp3d/>
-        </p:spPr>
-        <p:style>
-          <a:lnRef idx="0">
-            <a:scrgbClr r="0" g="0" b="0"/>
-          </a:lnRef>
-          <a:fillRef idx="0">
-            <a:scrgbClr r="0" g="0" b="0"/>
-          </a:fillRef>
-          <a:effectRef idx="0">
-            <a:scrgbClr r="0" g="0" b="0"/>
-          </a:effectRef>
-          <a:fontRef idx="none"/>
-        </p:style>
-        <p:txBody>
-          <a:bodyPr rot="0" spcFirstLastPara="1" vertOverflow="overflow" horzOverflow="overflow" vert="horz" wrap="square" lIns="50800" tIns="50800" rIns="50800" bIns="50800" numCol="1" spcCol="38100" rtlCol="0" anchor="ctr">
-            <a:spAutoFit/>
-          </a:bodyPr>
-          <a:lstStyle/>
-          <a:p>
-            <a:pPr marL="0" marR="0" indent="0" algn="ctr" defTabSz="825500" rtl="0" fontAlgn="auto" latinLnBrk="0" hangingPunct="0">
-              <a:lnSpc>
-                <a:spcPct val="100000"/>
-              </a:lnSpc>
-              <a:spcBef>
-                <a:spcPts val="0"/>
-              </a:spcBef>
-              <a:spcAft>
-                <a:spcPts val="0"/>
-              </a:spcAft>
-              <a:buClrTx/>
-              <a:buSzTx/>
-              <a:buFontTx/>
-              <a:buNone/>
-              <a:tabLst/>
-            </a:pPr>
-            <a:r>
-              <a:rPr kumimoji="0" lang="en-US" sz="7200" b="1" i="0" u="none" strike="noStrike" cap="none" spc="0" normalizeH="0" baseline="0" dirty="0">
-                <a:ln>
-                  <a:noFill/>
-                </a:ln>
-                <a:solidFill>
                   <a:schemeClr val="bg1"/>
                 </a:solidFill>
                 <a:effectLst/>
@@ -7960,51 +8383,44 @@
                 <a:cs typeface="Helvetica Neue"/>
                 <a:sym typeface="Helvetica Neue"/>
               </a:rPr>
-              <a:t>Hyperspectral camera</a:t>
-            </a:r>
-          </a:p>
-        </p:txBody>
-      </p:sp>
-      <p:pic>
-        <p:nvPicPr>
-          <p:cNvPr id="7" name="Picture 6" descr="A graph of a wave&#10;&#10;Description automatically generated">
+              <a:t>Fitting to a Blackbody</a:t>
+            </a:r>
+          </a:p>
+        </p:txBody>
+      </p:sp>
+      <p:sp>
+        <p:nvSpPr>
+          <p:cNvPr id="3" name="Slide Number Placeholder 2">
             <a:extLst>
               <a:ext uri="{FF2B5EF4-FFF2-40B4-BE49-F238E27FC236}">
-                <a16:creationId xmlns:a16="http://schemas.microsoft.com/office/drawing/2014/main" id="{3D0B9264-FE6C-9987-EAFA-0892C704AB30}"/>
+                <a16:creationId xmlns:a16="http://schemas.microsoft.com/office/drawing/2014/main" id="{9053F01A-9BD7-00BD-A876-9C0D8ACBBBBA}"/>
               </a:ext>
             </a:extLst>
           </p:cNvPr>
-          <p:cNvPicPr>
-            <a:picLocks noChangeAspect="1"/>
-          </p:cNvPicPr>
-          <p:nvPr/>
-        </p:nvPicPr>
-        <p:blipFill>
-          <a:blip r:embed="rId2">
-            <a:extLst>
-              <a:ext uri="{28A0092B-C50C-407E-A947-70E740481C1C}">
-                <a14:useLocalDpi xmlns:a14="http://schemas.microsoft.com/office/drawing/2010/main" val="0"/>
-              </a:ext>
-            </a:extLst>
-          </a:blip>
-          <a:stretch>
-            <a:fillRect/>
-          </a:stretch>
-        </p:blipFill>
-        <p:spPr>
-          <a:xfrm>
-            <a:off x="6920942" y="4751200"/>
-            <a:ext cx="10542116" cy="6744114"/>
-          </a:xfrm>
-          <a:prstGeom prst="rect">
-            <a:avLst/>
-          </a:prstGeom>
-        </p:spPr>
-      </p:pic>
+          <p:cNvSpPr>
+            <a:spLocks noGrp="1"/>
+          </p:cNvSpPr>
+          <p:nvPr>
+            <p:ph type="sldNum" sz="quarter" idx="2"/>
+          </p:nvPr>
+        </p:nvSpPr>
+        <p:spPr/>
+        <p:txBody>
+          <a:bodyPr/>
+          <a:lstStyle/>
+          <a:p>
+            <a:fld id="{86CB4B4D-7CA3-9044-876B-883B54F8677D}" type="slidenum">
+              <a:rPr lang="en-US" smtClean="0"/>
+              <a:t>15</a:t>
+            </a:fld>
+            <a:endParaRPr lang="en-US"/>
+          </a:p>
+        </p:txBody>
+      </p:sp>
     </p:spTree>
     <p:extLst>
       <p:ext uri="{BB962C8B-B14F-4D97-AF65-F5344CB8AC3E}">
-        <p14:creationId xmlns:p14="http://schemas.microsoft.com/office/powerpoint/2010/main" val="3803621524"/>
+        <p14:creationId xmlns:p14="http://schemas.microsoft.com/office/powerpoint/2010/main" val="3609982754"/>
       </p:ext>
     </p:extLst>
   </p:cSld>
@@ -8111,99 +8527,17 @@
                 <a:cs typeface="Helvetica Neue"/>
                 <a:sym typeface="Helvetica Neue"/>
               </a:rPr>
-              <a:t>Measuring more than Infrared</a:t>
-            </a:r>
-          </a:p>
-        </p:txBody>
-      </p:sp>
-      <p:sp>
-        <p:nvSpPr>
-          <p:cNvPr id="4" name="TextBox 3">
-            <a:extLst>
-              <a:ext uri="{FF2B5EF4-FFF2-40B4-BE49-F238E27FC236}">
-                <a16:creationId xmlns:a16="http://schemas.microsoft.com/office/drawing/2014/main" id="{E60F9A97-FA66-A5E7-6D61-C1A428C7659A}"/>
-              </a:ext>
-            </a:extLst>
-          </p:cNvPr>
-          <p:cNvSpPr txBox="1"/>
-          <p:nvPr/>
-        </p:nvSpPr>
-        <p:spPr>
-          <a:xfrm>
-            <a:off x="2929749" y="2812473"/>
-            <a:ext cx="18524502" cy="1210588"/>
-          </a:xfrm>
-          <a:prstGeom prst="rect">
-            <a:avLst/>
-          </a:prstGeom>
-          <a:noFill/>
-          <a:ln w="12700" cap="flat">
-            <a:noFill/>
-            <a:miter lim="400000"/>
-          </a:ln>
-          <a:effectLst/>
-          <a:sp3d/>
-        </p:spPr>
-        <p:style>
-          <a:lnRef idx="0">
-            <a:scrgbClr r="0" g="0" b="0"/>
-          </a:lnRef>
-          <a:fillRef idx="0">
-            <a:scrgbClr r="0" g="0" b="0"/>
-          </a:fillRef>
-          <a:effectRef idx="0">
-            <a:scrgbClr r="0" g="0" b="0"/>
-          </a:effectRef>
-          <a:fontRef idx="none"/>
-        </p:style>
-        <p:txBody>
-          <a:bodyPr rot="0" spcFirstLastPara="1" vertOverflow="overflow" horzOverflow="overflow" vert="horz" wrap="square" lIns="50800" tIns="50800" rIns="50800" bIns="50800" numCol="1" spcCol="38100" rtlCol="0" anchor="ctr">
-            <a:spAutoFit/>
-          </a:bodyPr>
-          <a:lstStyle/>
-          <a:p>
-            <a:pPr marL="0" marR="0" indent="0" algn="ctr" defTabSz="825500" rtl="0" fontAlgn="auto" latinLnBrk="0" hangingPunct="0">
-              <a:lnSpc>
-                <a:spcPct val="100000"/>
-              </a:lnSpc>
-              <a:spcBef>
-                <a:spcPts val="0"/>
-              </a:spcBef>
-              <a:spcAft>
-                <a:spcPts val="0"/>
-              </a:spcAft>
-              <a:buClrTx/>
-              <a:buSzTx/>
-              <a:buFontTx/>
-              <a:buNone/>
-              <a:tabLst/>
-            </a:pPr>
-            <a:r>
-              <a:rPr kumimoji="0" lang="en-US" sz="7200" b="1" i="0" u="none" strike="noStrike" cap="none" spc="0" normalizeH="0" baseline="0" dirty="0">
-                <a:ln>
-                  <a:noFill/>
-                </a:ln>
-                <a:solidFill>
-                  <a:schemeClr val="bg1"/>
-                </a:solidFill>
-                <a:effectLst/>
-                <a:uFillTx/>
-                <a:latin typeface="Helvetica Neue"/>
-                <a:ea typeface="Helvetica Neue"/>
-                <a:cs typeface="Helvetica Neue"/>
-                <a:sym typeface="Helvetica Neue"/>
-              </a:rPr>
-              <a:t>Hyperspectral camera</a:t>
+              <a:t>Fitting to a Blackbody</a:t>
             </a:r>
           </a:p>
         </p:txBody>
       </p:sp>
       <p:pic>
         <p:nvPicPr>
-          <p:cNvPr id="7" name="Picture 6" descr="A graph of a wave&#10;&#10;Description automatically generated">
+          <p:cNvPr id="9" name="Picture 8" descr="A close-up of a smiley face&#10;&#10;Description automatically generated">
             <a:extLst>
               <a:ext uri="{FF2B5EF4-FFF2-40B4-BE49-F238E27FC236}">
-                <a16:creationId xmlns:a16="http://schemas.microsoft.com/office/drawing/2014/main" id="{3D0B9264-FE6C-9987-EAFA-0892C704AB30}"/>
+                <a16:creationId xmlns:a16="http://schemas.microsoft.com/office/drawing/2014/main" id="{4FB5FAFD-C253-A365-ED64-193379C6C94B}"/>
               </a:ext>
             </a:extLst>
           </p:cNvPr>
@@ -8226,8 +8560,8 @@
         </p:blipFill>
         <p:spPr>
           <a:xfrm>
-            <a:off x="6920942" y="4751200"/>
-            <a:ext cx="10542116" cy="6744114"/>
+            <a:off x="3206125" y="2882355"/>
+            <a:ext cx="17971750" cy="3107898"/>
           </a:xfrm>
           <a:prstGeom prst="rect">
             <a:avLst/>
@@ -8236,90 +8570,37 @@
       </p:pic>
       <p:sp>
         <p:nvSpPr>
-          <p:cNvPr id="3" name="TextBox 2">
+          <p:cNvPr id="3" name="Slide Number Placeholder 2">
             <a:extLst>
               <a:ext uri="{FF2B5EF4-FFF2-40B4-BE49-F238E27FC236}">
-                <a16:creationId xmlns:a16="http://schemas.microsoft.com/office/drawing/2014/main" id="{0CA42D85-2BCE-9959-89DB-43480A92FA92}"/>
+                <a16:creationId xmlns:a16="http://schemas.microsoft.com/office/drawing/2014/main" id="{D6B8CFF0-5ED8-348D-837E-42CFD651DA6B}"/>
               </a:ext>
             </a:extLst>
           </p:cNvPr>
-          <p:cNvSpPr txBox="1"/>
-          <p:nvPr/>
-        </p:nvSpPr>
-        <p:spPr>
-          <a:xfrm>
-            <a:off x="13894484" y="5347153"/>
-            <a:ext cx="2834109" cy="1118255"/>
-          </a:xfrm>
-          <a:prstGeom prst="rect">
-            <a:avLst/>
-          </a:prstGeom>
-          <a:noFill/>
-          <a:ln w="12700" cap="flat">
-            <a:noFill/>
-            <a:miter lim="400000"/>
-          </a:ln>
-          <a:effectLst/>
-          <a:sp3d/>
-        </p:spPr>
-        <p:style>
-          <a:lnRef idx="0">
-            <a:scrgbClr r="0" g="0" b="0"/>
-          </a:lnRef>
-          <a:fillRef idx="0">
-            <a:scrgbClr r="0" g="0" b="0"/>
-          </a:fillRef>
-          <a:effectRef idx="0">
-            <a:scrgbClr r="0" g="0" b="0"/>
-          </a:effectRef>
-          <a:fontRef idx="none"/>
-        </p:style>
-        <p:txBody>
-          <a:bodyPr rot="0" spcFirstLastPara="1" vertOverflow="overflow" horzOverflow="overflow" vert="horz" wrap="none" lIns="50800" tIns="50800" rIns="50800" bIns="50800" numCol="1" spcCol="38100" rtlCol="0" anchor="ctr">
-            <a:spAutoFit/>
-          </a:bodyPr>
+          <p:cNvSpPr>
+            <a:spLocks noGrp="1"/>
+          </p:cNvSpPr>
+          <p:nvPr>
+            <p:ph type="sldNum" sz="quarter" idx="2"/>
+          </p:nvPr>
+        </p:nvSpPr>
+        <p:spPr/>
+        <p:txBody>
+          <a:bodyPr/>
           <a:lstStyle/>
           <a:p>
-            <a:pPr marL="0" marR="0" indent="0" algn="ctr" defTabSz="825500" rtl="0" fontAlgn="auto" latinLnBrk="0" hangingPunct="0">
-              <a:lnSpc>
-                <a:spcPct val="100000"/>
-              </a:lnSpc>
-              <a:spcBef>
-                <a:spcPts val="0"/>
-              </a:spcBef>
-              <a:spcAft>
-                <a:spcPts val="0"/>
-              </a:spcAft>
-              <a:buClrTx/>
-              <a:buSzTx/>
-              <a:buFontTx/>
-              <a:buNone/>
-              <a:tabLst/>
-            </a:pPr>
-            <a:r>
-              <a:rPr kumimoji="0" lang="en-US" sz="6600" b="1" i="0" u="none" strike="noStrike" cap="none" spc="0" normalizeH="0" baseline="0" dirty="0">
-                <a:ln>
-                  <a:noFill/>
-                </a:ln>
-                <a:solidFill>
-                  <a:srgbClr val="000000"/>
-                </a:solidFill>
-                <a:effectLst/>
-                <a:uFillTx/>
-                <a:latin typeface="Helvetica Neue"/>
-                <a:ea typeface="Helvetica Neue"/>
-                <a:cs typeface="Helvetica Neue"/>
-                <a:sym typeface="Helvetica Neue"/>
-              </a:rPr>
-              <a:t>5500 K</a:t>
-            </a:r>
+            <a:fld id="{86CB4B4D-7CA3-9044-876B-883B54F8677D}" type="slidenum">
+              <a:rPr lang="en-US" smtClean="0"/>
+              <a:t>16</a:t>
+            </a:fld>
+            <a:endParaRPr lang="en-US"/>
           </a:p>
         </p:txBody>
       </p:sp>
     </p:spTree>
     <p:extLst>
       <p:ext uri="{BB962C8B-B14F-4D97-AF65-F5344CB8AC3E}">
-        <p14:creationId xmlns:p14="http://schemas.microsoft.com/office/powerpoint/2010/main" val="3501434362"/>
+        <p14:creationId xmlns:p14="http://schemas.microsoft.com/office/powerpoint/2010/main" val="3953800407"/>
       </p:ext>
     </p:extLst>
   </p:cSld>
@@ -8415,6 +8696,124 @@
                   <a:noFill/>
                 </a:ln>
                 <a:solidFill>
+                  <a:schemeClr val="bg2">
+                    <a:lumMod val="90000"/>
+                  </a:schemeClr>
+                </a:solidFill>
+                <a:effectLst/>
+                <a:uFillTx/>
+                <a:latin typeface="Helvetica Neue"/>
+                <a:ea typeface="Helvetica Neue"/>
+                <a:cs typeface="Helvetica Neue"/>
+                <a:sym typeface="Helvetica Neue"/>
+              </a:rPr>
+              <a:t>Fitting to a Blackbody</a:t>
+            </a:r>
+          </a:p>
+        </p:txBody>
+      </p:sp>
+      <p:pic>
+        <p:nvPicPr>
+          <p:cNvPr id="9" name="Picture 8" descr="A close-up of a smiley face&#10;&#10;Description automatically generated">
+            <a:extLst>
+              <a:ext uri="{FF2B5EF4-FFF2-40B4-BE49-F238E27FC236}">
+                <a16:creationId xmlns:a16="http://schemas.microsoft.com/office/drawing/2014/main" id="{4FB5FAFD-C253-A365-ED64-193379C6C94B}"/>
+              </a:ext>
+            </a:extLst>
+          </p:cNvPr>
+          <p:cNvPicPr>
+            <a:picLocks noChangeAspect="1"/>
+          </p:cNvPicPr>
+          <p:nvPr/>
+        </p:nvPicPr>
+        <p:blipFill>
+          <a:blip r:embed="rId2">
+            <a:extLst>
+              <a:ext uri="{28A0092B-C50C-407E-A947-70E740481C1C}">
+                <a14:useLocalDpi xmlns:a14="http://schemas.microsoft.com/office/drawing/2010/main" val="0"/>
+              </a:ext>
+            </a:extLst>
+          </a:blip>
+          <a:stretch>
+            <a:fillRect/>
+          </a:stretch>
+        </p:blipFill>
+        <p:spPr>
+          <a:xfrm>
+            <a:off x="3206125" y="2882355"/>
+            <a:ext cx="17971750" cy="3107898"/>
+          </a:xfrm>
+          <a:prstGeom prst="rect">
+            <a:avLst/>
+          </a:prstGeom>
+        </p:spPr>
+      </p:pic>
+      <p:sp>
+        <p:nvSpPr>
+          <p:cNvPr id="10" name="TextBox 9">
+            <a:extLst>
+              <a:ext uri="{FF2B5EF4-FFF2-40B4-BE49-F238E27FC236}">
+                <a16:creationId xmlns:a16="http://schemas.microsoft.com/office/drawing/2014/main" id="{3E7E3C74-695E-D803-84EA-AF72C7FF35E7}"/>
+              </a:ext>
+            </a:extLst>
+          </p:cNvPr>
+          <p:cNvSpPr txBox="1"/>
+          <p:nvPr/>
+        </p:nvSpPr>
+        <p:spPr>
+          <a:xfrm flipH="1">
+            <a:off x="3206125" y="7411998"/>
+            <a:ext cx="17945882" cy="2318583"/>
+          </a:xfrm>
+          <a:prstGeom prst="rect">
+            <a:avLst/>
+          </a:prstGeom>
+          <a:noFill/>
+          <a:ln w="12700" cap="flat">
+            <a:noFill/>
+            <a:miter lim="400000"/>
+          </a:ln>
+          <a:effectLst/>
+          <a:sp3d/>
+        </p:spPr>
+        <p:style>
+          <a:lnRef idx="0">
+            <a:scrgbClr r="0" g="0" b="0"/>
+          </a:lnRef>
+          <a:fillRef idx="0">
+            <a:scrgbClr r="0" g="0" b="0"/>
+          </a:fillRef>
+          <a:effectRef idx="0">
+            <a:scrgbClr r="0" g="0" b="0"/>
+          </a:effectRef>
+          <a:fontRef idx="none"/>
+        </p:style>
+        <p:txBody>
+          <a:bodyPr rot="0" spcFirstLastPara="1" vertOverflow="overflow" horzOverflow="overflow" vert="horz" wrap="square" lIns="50800" tIns="50800" rIns="50800" bIns="50800" numCol="1" spcCol="38100" rtlCol="0" anchor="ctr">
+            <a:spAutoFit/>
+          </a:bodyPr>
+          <a:lstStyle/>
+          <a:p>
+            <a:pPr marR="0" algn="l" defTabSz="825500" rtl="0" fontAlgn="auto" latinLnBrk="0" hangingPunct="0">
+              <a:lnSpc>
+                <a:spcPct val="100000"/>
+              </a:lnSpc>
+              <a:spcBef>
+                <a:spcPts val="0"/>
+              </a:spcBef>
+              <a:spcAft>
+                <a:spcPts val="0"/>
+              </a:spcAft>
+              <a:buClrTx/>
+              <a:buSzTx/>
+              <a:tabLst/>
+            </a:pPr>
+            <a:r>
+              <a:rPr kumimoji="0" lang="el-GR" sz="7200" b="1" i="0" u="none" strike="noStrike" cap="none" spc="0" normalizeH="0" baseline="0" dirty="0">
+                <a:ln>
+                  <a:noFill/>
+                </a:ln>
+                <a:solidFill>
                   <a:schemeClr val="bg1"/>
                 </a:solidFill>
                 <a:effectLst/>
@@ -8424,15 +8823,96 @@
                 <a:cs typeface="Helvetica Neue"/>
                 <a:sym typeface="Helvetica Neue"/>
               </a:rPr>
-              <a:t>Fitting to a Blackbody</a:t>
-            </a:r>
+              <a:t>ε</a:t>
+            </a:r>
+            <a:r>
+              <a:rPr kumimoji="0" lang="en-US" sz="7200" b="1" i="0" u="none" strike="noStrike" cap="none" spc="0" normalizeH="0" baseline="0" dirty="0">
+                <a:ln>
+                  <a:noFill/>
+                </a:ln>
+                <a:solidFill>
+                  <a:schemeClr val="bg1"/>
+                </a:solidFill>
+                <a:effectLst/>
+                <a:uFillTx/>
+                <a:latin typeface="Helvetica Neue"/>
+                <a:ea typeface="Helvetica Neue"/>
+                <a:cs typeface="Helvetica Neue"/>
+                <a:sym typeface="Helvetica Neue"/>
+              </a:rPr>
+              <a:t>: emissivity</a:t>
+            </a:r>
+          </a:p>
+          <a:p>
+            <a:pPr marR="0" algn="l" defTabSz="825500" rtl="0" fontAlgn="auto" latinLnBrk="0" hangingPunct="0">
+              <a:lnSpc>
+                <a:spcPct val="100000"/>
+              </a:lnSpc>
+              <a:spcBef>
+                <a:spcPts val="0"/>
+              </a:spcBef>
+              <a:spcAft>
+                <a:spcPts val="0"/>
+              </a:spcAft>
+              <a:buClrTx/>
+              <a:buSzTx/>
+              <a:tabLst/>
+            </a:pPr>
+            <a:r>
+              <a:rPr kumimoji="0" lang="en-US" sz="7200" b="1" i="0" u="none" strike="noStrike" cap="none" spc="0" normalizeH="0" baseline="0" dirty="0">
+                <a:ln>
+                  <a:noFill/>
+                </a:ln>
+                <a:solidFill>
+                  <a:schemeClr val="bg2">
+                    <a:lumMod val="90000"/>
+                  </a:schemeClr>
+                </a:solidFill>
+                <a:effectLst/>
+                <a:uFillTx/>
+                <a:latin typeface="Helvetica Neue"/>
+                <a:ea typeface="Helvetica Neue"/>
+                <a:cs typeface="Helvetica Neue"/>
+                <a:sym typeface="Helvetica Neue"/>
+              </a:rPr>
+              <a:t>T: temperature (what we want!)</a:t>
+            </a:r>
+          </a:p>
+        </p:txBody>
+      </p:sp>
+      <p:sp>
+        <p:nvSpPr>
+          <p:cNvPr id="3" name="Slide Number Placeholder 2">
+            <a:extLst>
+              <a:ext uri="{FF2B5EF4-FFF2-40B4-BE49-F238E27FC236}">
+                <a16:creationId xmlns:a16="http://schemas.microsoft.com/office/drawing/2014/main" id="{43A26354-A242-F9A6-6255-7299CD72AC2F}"/>
+              </a:ext>
+            </a:extLst>
+          </p:cNvPr>
+          <p:cNvSpPr>
+            <a:spLocks noGrp="1"/>
+          </p:cNvSpPr>
+          <p:nvPr>
+            <p:ph type="sldNum" sz="quarter" idx="2"/>
+          </p:nvPr>
+        </p:nvSpPr>
+        <p:spPr/>
+        <p:txBody>
+          <a:bodyPr/>
+          <a:lstStyle/>
+          <a:p>
+            <a:fld id="{86CB4B4D-7CA3-9044-876B-883B54F8677D}" type="slidenum">
+              <a:rPr lang="en-US" smtClean="0"/>
+              <a:t>17</a:t>
+            </a:fld>
+            <a:endParaRPr lang="en-US"/>
           </a:p>
         </p:txBody>
       </p:sp>
     </p:spTree>
     <p:extLst>
       <p:ext uri="{BB962C8B-B14F-4D97-AF65-F5344CB8AC3E}">
-        <p14:creationId xmlns:p14="http://schemas.microsoft.com/office/powerpoint/2010/main" val="3609982754"/>
+        <p14:creationId xmlns:p14="http://schemas.microsoft.com/office/powerpoint/2010/main" val="1983402194"/>
       </p:ext>
     </p:extLst>
   </p:cSld>
@@ -8580,10 +9060,173 @@
           </a:prstGeom>
         </p:spPr>
       </p:pic>
+      <p:sp>
+        <p:nvSpPr>
+          <p:cNvPr id="10" name="TextBox 9">
+            <a:extLst>
+              <a:ext uri="{FF2B5EF4-FFF2-40B4-BE49-F238E27FC236}">
+                <a16:creationId xmlns:a16="http://schemas.microsoft.com/office/drawing/2014/main" id="{3E7E3C74-695E-D803-84EA-AF72C7FF35E7}"/>
+              </a:ext>
+            </a:extLst>
+          </p:cNvPr>
+          <p:cNvSpPr txBox="1"/>
+          <p:nvPr/>
+        </p:nvSpPr>
+        <p:spPr>
+          <a:xfrm flipH="1">
+            <a:off x="3206125" y="7411998"/>
+            <a:ext cx="17945882" cy="2318583"/>
+          </a:xfrm>
+          <a:prstGeom prst="rect">
+            <a:avLst/>
+          </a:prstGeom>
+          <a:noFill/>
+          <a:ln w="12700" cap="flat">
+            <a:noFill/>
+            <a:miter lim="400000"/>
+          </a:ln>
+          <a:effectLst/>
+          <a:sp3d/>
+        </p:spPr>
+        <p:style>
+          <a:lnRef idx="0">
+            <a:scrgbClr r="0" g="0" b="0"/>
+          </a:lnRef>
+          <a:fillRef idx="0">
+            <a:scrgbClr r="0" g="0" b="0"/>
+          </a:fillRef>
+          <a:effectRef idx="0">
+            <a:scrgbClr r="0" g="0" b="0"/>
+          </a:effectRef>
+          <a:fontRef idx="none"/>
+        </p:style>
+        <p:txBody>
+          <a:bodyPr rot="0" spcFirstLastPara="1" vertOverflow="overflow" horzOverflow="overflow" vert="horz" wrap="square" lIns="50800" tIns="50800" rIns="50800" bIns="50800" numCol="1" spcCol="38100" rtlCol="0" anchor="ctr">
+            <a:spAutoFit/>
+          </a:bodyPr>
+          <a:lstStyle/>
+          <a:p>
+            <a:pPr marR="0" algn="l" defTabSz="825500" rtl="0" fontAlgn="auto" latinLnBrk="0" hangingPunct="0">
+              <a:lnSpc>
+                <a:spcPct val="100000"/>
+              </a:lnSpc>
+              <a:spcBef>
+                <a:spcPts val="0"/>
+              </a:spcBef>
+              <a:spcAft>
+                <a:spcPts val="0"/>
+              </a:spcAft>
+              <a:buClrTx/>
+              <a:buSzTx/>
+              <a:tabLst/>
+            </a:pPr>
+            <a:r>
+              <a:rPr kumimoji="0" lang="el-GR" sz="7200" b="1" i="0" u="none" strike="noStrike" cap="none" spc="0" normalizeH="0" baseline="0" dirty="0">
+                <a:ln>
+                  <a:noFill/>
+                </a:ln>
+                <a:solidFill>
+                  <a:schemeClr val="bg2">
+                    <a:lumMod val="90000"/>
+                  </a:schemeClr>
+                </a:solidFill>
+                <a:effectLst/>
+                <a:uFillTx/>
+                <a:latin typeface="Helvetica Neue"/>
+                <a:ea typeface="Helvetica Neue"/>
+                <a:cs typeface="Helvetica Neue"/>
+                <a:sym typeface="Helvetica Neue"/>
+              </a:rPr>
+              <a:t>ε</a:t>
+            </a:r>
+            <a:r>
+              <a:rPr kumimoji="0" lang="en-US" sz="7200" b="1" i="0" u="none" strike="noStrike" cap="none" spc="0" normalizeH="0" baseline="0" dirty="0">
+                <a:ln>
+                  <a:noFill/>
+                </a:ln>
+                <a:solidFill>
+                  <a:schemeClr val="bg2">
+                    <a:lumMod val="90000"/>
+                  </a:schemeClr>
+                </a:solidFill>
+                <a:effectLst/>
+                <a:uFillTx/>
+                <a:latin typeface="Helvetica Neue"/>
+                <a:ea typeface="Helvetica Neue"/>
+                <a:cs typeface="Helvetica Neue"/>
+                <a:sym typeface="Helvetica Neue"/>
+              </a:rPr>
+              <a:t>: emissivity</a:t>
+            </a:r>
+          </a:p>
+          <a:p>
+            <a:pPr marR="0" algn="l" defTabSz="825500" rtl="0" fontAlgn="auto" latinLnBrk="0" hangingPunct="0">
+              <a:lnSpc>
+                <a:spcPct val="100000"/>
+              </a:lnSpc>
+              <a:spcBef>
+                <a:spcPts val="0"/>
+              </a:spcBef>
+              <a:spcAft>
+                <a:spcPts val="0"/>
+              </a:spcAft>
+              <a:buClrTx/>
+              <a:buSzTx/>
+              <a:tabLst/>
+            </a:pPr>
+            <a:r>
+              <a:rPr kumimoji="0" lang="en-US" sz="7200" b="1" i="0" u="none" strike="noStrike" cap="none" spc="0" normalizeH="0" baseline="0" dirty="0">
+                <a:ln>
+                  <a:noFill/>
+                </a:ln>
+                <a:solidFill>
+                  <a:schemeClr val="bg1"/>
+                </a:solidFill>
+                <a:effectLst/>
+                <a:uFillTx/>
+                <a:latin typeface="Helvetica Neue"/>
+                <a:ea typeface="Helvetica Neue"/>
+                <a:cs typeface="Helvetica Neue"/>
+                <a:sym typeface="Helvetica Neue"/>
+              </a:rPr>
+              <a:t>T: temperature (what we want!)</a:t>
+            </a:r>
+          </a:p>
+        </p:txBody>
+      </p:sp>
+      <p:sp>
+        <p:nvSpPr>
+          <p:cNvPr id="3" name="Slide Number Placeholder 2">
+            <a:extLst>
+              <a:ext uri="{FF2B5EF4-FFF2-40B4-BE49-F238E27FC236}">
+                <a16:creationId xmlns:a16="http://schemas.microsoft.com/office/drawing/2014/main" id="{A48CADFB-9693-9CE6-D517-DDFF2A6472C3}"/>
+              </a:ext>
+            </a:extLst>
+          </p:cNvPr>
+          <p:cNvSpPr>
+            <a:spLocks noGrp="1"/>
+          </p:cNvSpPr>
+          <p:nvPr>
+            <p:ph type="sldNum" sz="quarter" idx="2"/>
+          </p:nvPr>
+        </p:nvSpPr>
+        <p:spPr/>
+        <p:txBody>
+          <a:bodyPr/>
+          <a:lstStyle/>
+          <a:p>
+            <a:fld id="{86CB4B4D-7CA3-9044-876B-883B54F8677D}" type="slidenum">
+              <a:rPr lang="en-US" smtClean="0"/>
+              <a:t>18</a:t>
+            </a:fld>
+            <a:endParaRPr lang="en-US"/>
+          </a:p>
+        </p:txBody>
+      </p:sp>
     </p:spTree>
     <p:extLst>
       <p:ext uri="{BB962C8B-B14F-4D97-AF65-F5344CB8AC3E}">
-        <p14:creationId xmlns:p14="http://schemas.microsoft.com/office/powerpoint/2010/main" val="3953800407"/>
+        <p14:creationId xmlns:p14="http://schemas.microsoft.com/office/powerpoint/2010/main" val="2476073459"/>
       </p:ext>
     </p:extLst>
   </p:cSld>
@@ -8710,7 +9353,7 @@
           <p:nvPr/>
         </p:nvPicPr>
         <p:blipFill>
-          <a:blip r:embed="rId2">
+          <a:blip r:embed="rId3">
             <a:extLst>
               <a:ext uri="{28A0092B-C50C-407E-A947-70E740481C1C}">
                 <a14:useLocalDpi xmlns:a14="http://schemas.microsoft.com/office/drawing/2010/main" val="0"/>
@@ -8797,7 +9440,9 @@
                   <a:noFill/>
                 </a:ln>
                 <a:solidFill>
-                  <a:schemeClr val="bg1"/>
+                  <a:schemeClr val="bg2">
+                    <a:lumMod val="90000"/>
+                  </a:schemeClr>
                 </a:solidFill>
                 <a:effectLst/>
                 <a:uFillTx/>
@@ -8807,6 +9452,25 @@
                 <a:sym typeface="Helvetica Neue"/>
               </a:rPr>
               <a:t>ε</a:t>
+            </a:r>
+            <a:r>
+              <a:rPr kumimoji="0" lang="en-US" sz="7200" b="1" i="0" u="none" strike="noStrike" cap="none" spc="0" normalizeH="0" baseline="0" dirty="0">
+                <a:ln>
+                  <a:noFill/>
+                </a:ln>
+                <a:solidFill>
+                  <a:schemeClr val="bg2">
+                    <a:lumMod val="90000"/>
+                  </a:schemeClr>
+                </a:solidFill>
+                <a:effectLst/>
+                <a:uFillTx/>
+                <a:latin typeface="Helvetica Neue"/>
+                <a:ea typeface="Helvetica Neue"/>
+                <a:cs typeface="Helvetica Neue"/>
+                <a:sym typeface="Helvetica Neue"/>
+              </a:rPr>
+              <a:t>: emissivity is </a:t>
             </a:r>
             <a:r>
               <a:rPr kumimoji="0" lang="en-US" sz="7200" b="1" i="0" u="none" strike="noStrike" cap="none" spc="0" normalizeH="0" baseline="0" dirty="0">
@@ -8823,7 +9487,7 @@
                 <a:cs typeface="Helvetica Neue"/>
                 <a:sym typeface="Helvetica Neue"/>
               </a:rPr>
-              <a:t>: emissivity</a:t>
+              <a:t>wavelength dependent</a:t>
             </a:r>
           </a:p>
           <a:p>
@@ -8863,10 +9527,39 @@
           </a:p>
         </p:txBody>
       </p:sp>
+      <p:sp>
+        <p:nvSpPr>
+          <p:cNvPr id="3" name="Slide Number Placeholder 2">
+            <a:extLst>
+              <a:ext uri="{FF2B5EF4-FFF2-40B4-BE49-F238E27FC236}">
+                <a16:creationId xmlns:a16="http://schemas.microsoft.com/office/drawing/2014/main" id="{A48CADFB-9693-9CE6-D517-DDFF2A6472C3}"/>
+              </a:ext>
+            </a:extLst>
+          </p:cNvPr>
+          <p:cNvSpPr>
+            <a:spLocks noGrp="1"/>
+          </p:cNvSpPr>
+          <p:nvPr>
+            <p:ph type="sldNum" sz="quarter" idx="2"/>
+          </p:nvPr>
+        </p:nvSpPr>
+        <p:spPr/>
+        <p:txBody>
+          <a:bodyPr/>
+          <a:lstStyle/>
+          <a:p>
+            <a:fld id="{86CB4B4D-7CA3-9044-876B-883B54F8677D}" type="slidenum">
+              <a:rPr lang="en-US" smtClean="0"/>
+              <a:t>19</a:t>
+            </a:fld>
+            <a:endParaRPr lang="en-US"/>
+          </a:p>
+        </p:txBody>
+      </p:sp>
     </p:spTree>
     <p:extLst>
       <p:ext uri="{BB962C8B-B14F-4D97-AF65-F5344CB8AC3E}">
-        <p14:creationId xmlns:p14="http://schemas.microsoft.com/office/powerpoint/2010/main" val="1983402194"/>
+        <p14:creationId xmlns:p14="http://schemas.microsoft.com/office/powerpoint/2010/main" val="2395514860"/>
       </p:ext>
     </p:extLst>
   </p:cSld>
@@ -9092,6 +9785,35 @@
               <a:cs typeface="Helvetica Neue"/>
               <a:sym typeface="Helvetica Neue"/>
             </a:endParaRPr>
+          </a:p>
+        </p:txBody>
+      </p:sp>
+      <p:sp>
+        <p:nvSpPr>
+          <p:cNvPr id="3" name="Slide Number Placeholder 2">
+            <a:extLst>
+              <a:ext uri="{FF2B5EF4-FFF2-40B4-BE49-F238E27FC236}">
+                <a16:creationId xmlns:a16="http://schemas.microsoft.com/office/drawing/2014/main" id="{9478A66F-D7AA-8222-ADF1-85140DF08D4D}"/>
+              </a:ext>
+            </a:extLst>
+          </p:cNvPr>
+          <p:cNvSpPr>
+            <a:spLocks noGrp="1"/>
+          </p:cNvSpPr>
+          <p:nvPr>
+            <p:ph type="sldNum" sz="quarter" idx="2"/>
+          </p:nvPr>
+        </p:nvSpPr>
+        <p:spPr/>
+        <p:txBody>
+          <a:bodyPr/>
+          <a:lstStyle/>
+          <a:p>
+            <a:fld id="{86CB4B4D-7CA3-9044-876B-883B54F8677D}" type="slidenum">
+              <a:rPr lang="en-US" smtClean="0"/>
+              <a:t>2</a:t>
+            </a:fld>
+            <a:endParaRPr lang="en-US"/>
           </a:p>
         </p:txBody>
       </p:sp>
@@ -9140,6 +9862,654 @@
         </p:nvSpPr>
         <p:spPr>
           <a:xfrm>
+            <a:off x="2425959" y="1232835"/>
+            <a:ext cx="19532082" cy="1210588"/>
+          </a:xfrm>
+          <a:prstGeom prst="rect">
+            <a:avLst/>
+          </a:prstGeom>
+          <a:noFill/>
+          <a:ln w="12700" cap="flat">
+            <a:noFill/>
+            <a:miter lim="400000"/>
+          </a:ln>
+          <a:effectLst/>
+          <a:sp3d/>
+        </p:spPr>
+        <p:style>
+          <a:lnRef idx="0">
+            <a:scrgbClr r="0" g="0" b="0"/>
+          </a:lnRef>
+          <a:fillRef idx="0">
+            <a:scrgbClr r="0" g="0" b="0"/>
+          </a:fillRef>
+          <a:effectRef idx="0">
+            <a:scrgbClr r="0" g="0" b="0"/>
+          </a:effectRef>
+          <a:fontRef idx="none"/>
+        </p:style>
+        <p:txBody>
+          <a:bodyPr rot="0" spcFirstLastPara="1" vertOverflow="overflow" horzOverflow="overflow" vert="horz" wrap="square" lIns="50800" tIns="50800" rIns="50800" bIns="50800" numCol="1" spcCol="38100" rtlCol="0" anchor="ctr">
+            <a:spAutoFit/>
+          </a:bodyPr>
+          <a:lstStyle/>
+          <a:p>
+            <a:pPr marR="0" algn="l" defTabSz="825500" rtl="0" fontAlgn="auto" latinLnBrk="0" hangingPunct="0">
+              <a:lnSpc>
+                <a:spcPct val="100000"/>
+              </a:lnSpc>
+              <a:spcBef>
+                <a:spcPts val="0"/>
+              </a:spcBef>
+              <a:spcAft>
+                <a:spcPts val="0"/>
+              </a:spcAft>
+              <a:buClrTx/>
+              <a:buSzTx/>
+              <a:tabLst/>
+            </a:pPr>
+            <a:r>
+              <a:rPr kumimoji="0" lang="el-GR" sz="7200" b="1" i="0" u="none" strike="noStrike" cap="none" spc="0" normalizeH="0" baseline="0" dirty="0">
+                <a:ln>
+                  <a:noFill/>
+                </a:ln>
+                <a:solidFill>
+                  <a:schemeClr val="bg2">
+                    <a:lumMod val="90000"/>
+                  </a:schemeClr>
+                </a:solidFill>
+                <a:effectLst/>
+                <a:uFillTx/>
+                <a:latin typeface="Helvetica Neue"/>
+                <a:ea typeface="Helvetica Neue"/>
+                <a:cs typeface="Helvetica Neue"/>
+                <a:sym typeface="Helvetica Neue"/>
+              </a:rPr>
+              <a:t>ε</a:t>
+            </a:r>
+            <a:r>
+              <a:rPr kumimoji="0" lang="en-US" sz="7200" b="1" i="0" u="none" strike="noStrike" cap="none" spc="0" normalizeH="0" baseline="0" dirty="0">
+                <a:ln>
+                  <a:noFill/>
+                </a:ln>
+                <a:solidFill>
+                  <a:schemeClr val="bg2">
+                    <a:lumMod val="90000"/>
+                  </a:schemeClr>
+                </a:solidFill>
+                <a:effectLst/>
+                <a:uFillTx/>
+                <a:latin typeface="Helvetica Neue"/>
+                <a:ea typeface="Helvetica Neue"/>
+                <a:cs typeface="Helvetica Neue"/>
+                <a:sym typeface="Helvetica Neue"/>
+              </a:rPr>
+              <a:t>: emissivity is </a:t>
+            </a:r>
+            <a:r>
+              <a:rPr kumimoji="0" lang="en-US" sz="7200" b="1" i="0" u="none" strike="noStrike" cap="none" spc="0" normalizeH="0" baseline="0" dirty="0">
+                <a:ln>
+                  <a:noFill/>
+                </a:ln>
+                <a:solidFill>
+                  <a:schemeClr val="bg1"/>
+                </a:solidFill>
+                <a:effectLst/>
+                <a:uFillTx/>
+                <a:latin typeface="Helvetica Neue"/>
+                <a:ea typeface="Helvetica Neue"/>
+                <a:cs typeface="Helvetica Neue"/>
+                <a:sym typeface="Helvetica Neue"/>
+              </a:rPr>
+              <a:t>wavelength dependent</a:t>
+            </a:r>
+          </a:p>
+        </p:txBody>
+      </p:sp>
+      <p:sp>
+        <p:nvSpPr>
+          <p:cNvPr id="3" name="Slide Number Placeholder 2">
+            <a:extLst>
+              <a:ext uri="{FF2B5EF4-FFF2-40B4-BE49-F238E27FC236}">
+                <a16:creationId xmlns:a16="http://schemas.microsoft.com/office/drawing/2014/main" id="{A48CADFB-9693-9CE6-D517-DDFF2A6472C3}"/>
+              </a:ext>
+            </a:extLst>
+          </p:cNvPr>
+          <p:cNvSpPr>
+            <a:spLocks noGrp="1"/>
+          </p:cNvSpPr>
+          <p:nvPr>
+            <p:ph type="sldNum" sz="quarter" idx="2"/>
+          </p:nvPr>
+        </p:nvSpPr>
+        <p:spPr/>
+        <p:txBody>
+          <a:bodyPr/>
+          <a:lstStyle/>
+          <a:p>
+            <a:fld id="{86CB4B4D-7CA3-9044-876B-883B54F8677D}" type="slidenum">
+              <a:rPr lang="en-US" smtClean="0"/>
+              <a:t>20</a:t>
+            </a:fld>
+            <a:endParaRPr lang="en-US"/>
+          </a:p>
+        </p:txBody>
+      </p:sp>
+    </p:spTree>
+    <p:extLst>
+      <p:ext uri="{BB962C8B-B14F-4D97-AF65-F5344CB8AC3E}">
+        <p14:creationId xmlns:p14="http://schemas.microsoft.com/office/powerpoint/2010/main" val="162345813"/>
+      </p:ext>
+    </p:extLst>
+  </p:cSld>
+  <p:clrMapOvr>
+    <a:masterClrMapping/>
+  </p:clrMapOvr>
+  <p:transition spd="med"/>
+</p:sld>
+</file>
+
+<file path=ppt/slides/slide21.xml><?xml version="1.0" encoding="utf-8"?>
+<p:sld xmlns:a="http://schemas.openxmlformats.org/drawingml/2006/main" xmlns:r="http://schemas.openxmlformats.org/officeDocument/2006/relationships" xmlns:p="http://schemas.openxmlformats.org/presentationml/2006/main">
+  <p:cSld>
+    <p:spTree>
+      <p:nvGrpSpPr>
+        <p:cNvPr id="1" name=""/>
+        <p:cNvGrpSpPr/>
+        <p:nvPr/>
+      </p:nvGrpSpPr>
+      <p:grpSpPr>
+        <a:xfrm>
+          <a:off x="0" y="0"/>
+          <a:ext cx="0" cy="0"/>
+          <a:chOff x="0" y="0"/>
+          <a:chExt cx="0" cy="0"/>
+        </a:xfrm>
+      </p:grpSpPr>
+      <p:sp>
+        <p:nvSpPr>
+          <p:cNvPr id="2" name="TextBox 1">
+            <a:extLst>
+              <a:ext uri="{FF2B5EF4-FFF2-40B4-BE49-F238E27FC236}">
+                <a16:creationId xmlns:a16="http://schemas.microsoft.com/office/drawing/2014/main" id="{F5234184-5221-BCB5-E484-82AF15B925F9}"/>
+              </a:ext>
+            </a:extLst>
+          </p:cNvPr>
+          <p:cNvSpPr txBox="1"/>
+          <p:nvPr/>
+        </p:nvSpPr>
+        <p:spPr>
+          <a:xfrm>
+            <a:off x="2425959" y="1232835"/>
+            <a:ext cx="19532082" cy="1210588"/>
+          </a:xfrm>
+          <a:prstGeom prst="rect">
+            <a:avLst/>
+          </a:prstGeom>
+          <a:noFill/>
+          <a:ln w="12700" cap="flat">
+            <a:noFill/>
+            <a:miter lim="400000"/>
+          </a:ln>
+          <a:effectLst/>
+          <a:sp3d/>
+        </p:spPr>
+        <p:style>
+          <a:lnRef idx="0">
+            <a:scrgbClr r="0" g="0" b="0"/>
+          </a:lnRef>
+          <a:fillRef idx="0">
+            <a:scrgbClr r="0" g="0" b="0"/>
+          </a:fillRef>
+          <a:effectRef idx="0">
+            <a:scrgbClr r="0" g="0" b="0"/>
+          </a:effectRef>
+          <a:fontRef idx="none"/>
+        </p:style>
+        <p:txBody>
+          <a:bodyPr rot="0" spcFirstLastPara="1" vertOverflow="overflow" horzOverflow="overflow" vert="horz" wrap="square" lIns="50800" tIns="50800" rIns="50800" bIns="50800" numCol="1" spcCol="38100" rtlCol="0" anchor="ctr">
+            <a:spAutoFit/>
+          </a:bodyPr>
+          <a:lstStyle/>
+          <a:p>
+            <a:pPr marR="0" algn="l" defTabSz="825500" rtl="0" fontAlgn="auto" latinLnBrk="0" hangingPunct="0">
+              <a:lnSpc>
+                <a:spcPct val="100000"/>
+              </a:lnSpc>
+              <a:spcBef>
+                <a:spcPts val="0"/>
+              </a:spcBef>
+              <a:spcAft>
+                <a:spcPts val="0"/>
+              </a:spcAft>
+              <a:buClrTx/>
+              <a:buSzTx/>
+              <a:tabLst/>
+            </a:pPr>
+            <a:r>
+              <a:rPr kumimoji="0" lang="el-GR" sz="7200" b="1" i="0" u="none" strike="noStrike" cap="none" spc="0" normalizeH="0" baseline="0" dirty="0">
+                <a:ln>
+                  <a:noFill/>
+                </a:ln>
+                <a:solidFill>
+                  <a:schemeClr val="bg2">
+                    <a:lumMod val="90000"/>
+                  </a:schemeClr>
+                </a:solidFill>
+                <a:effectLst/>
+                <a:uFillTx/>
+                <a:latin typeface="Helvetica Neue"/>
+                <a:ea typeface="Helvetica Neue"/>
+                <a:cs typeface="Helvetica Neue"/>
+                <a:sym typeface="Helvetica Neue"/>
+              </a:rPr>
+              <a:t>ε</a:t>
+            </a:r>
+            <a:r>
+              <a:rPr kumimoji="0" lang="en-US" sz="7200" b="1" i="0" u="none" strike="noStrike" cap="none" spc="0" normalizeH="0" baseline="0" dirty="0">
+                <a:ln>
+                  <a:noFill/>
+                </a:ln>
+                <a:solidFill>
+                  <a:schemeClr val="bg2">
+                    <a:lumMod val="90000"/>
+                  </a:schemeClr>
+                </a:solidFill>
+                <a:effectLst/>
+                <a:uFillTx/>
+                <a:latin typeface="Helvetica Neue"/>
+                <a:ea typeface="Helvetica Neue"/>
+                <a:cs typeface="Helvetica Neue"/>
+                <a:sym typeface="Helvetica Neue"/>
+              </a:rPr>
+              <a:t>: emissivity is wavelength dependent</a:t>
+            </a:r>
+          </a:p>
+        </p:txBody>
+      </p:sp>
+      <p:sp>
+        <p:nvSpPr>
+          <p:cNvPr id="3" name="Slide Number Placeholder 2">
+            <a:extLst>
+              <a:ext uri="{FF2B5EF4-FFF2-40B4-BE49-F238E27FC236}">
+                <a16:creationId xmlns:a16="http://schemas.microsoft.com/office/drawing/2014/main" id="{A48CADFB-9693-9CE6-D517-DDFF2A6472C3}"/>
+              </a:ext>
+            </a:extLst>
+          </p:cNvPr>
+          <p:cNvSpPr>
+            <a:spLocks noGrp="1"/>
+          </p:cNvSpPr>
+          <p:nvPr>
+            <p:ph type="sldNum" sz="quarter" idx="2"/>
+          </p:nvPr>
+        </p:nvSpPr>
+        <p:spPr/>
+        <p:txBody>
+          <a:bodyPr/>
+          <a:lstStyle/>
+          <a:p>
+            <a:fld id="{86CB4B4D-7CA3-9044-876B-883B54F8677D}" type="slidenum">
+              <a:rPr lang="en-US" smtClean="0"/>
+              <a:t>21</a:t>
+            </a:fld>
+            <a:endParaRPr lang="en-US"/>
+          </a:p>
+        </p:txBody>
+      </p:sp>
+      <p:sp>
+        <p:nvSpPr>
+          <p:cNvPr id="4" name="TextBox 3">
+            <a:extLst>
+              <a:ext uri="{FF2B5EF4-FFF2-40B4-BE49-F238E27FC236}">
+                <a16:creationId xmlns:a16="http://schemas.microsoft.com/office/drawing/2014/main" id="{C09D0660-CABA-CCB5-D748-0AEF7D599E1B}"/>
+              </a:ext>
+            </a:extLst>
+          </p:cNvPr>
+          <p:cNvSpPr txBox="1"/>
+          <p:nvPr/>
+        </p:nvSpPr>
+        <p:spPr>
+          <a:xfrm>
+            <a:off x="4428800" y="5329376"/>
+            <a:ext cx="15526400" cy="3057247"/>
+          </a:xfrm>
+          <a:prstGeom prst="rect">
+            <a:avLst/>
+          </a:prstGeom>
+          <a:noFill/>
+          <a:ln w="12700" cap="flat">
+            <a:noFill/>
+            <a:miter lim="400000"/>
+          </a:ln>
+          <a:effectLst/>
+          <a:sp3d/>
+        </p:spPr>
+        <p:style>
+          <a:lnRef idx="0">
+            <a:scrgbClr r="0" g="0" b="0"/>
+          </a:lnRef>
+          <a:fillRef idx="0">
+            <a:scrgbClr r="0" g="0" b="0"/>
+          </a:fillRef>
+          <a:effectRef idx="0">
+            <a:scrgbClr r="0" g="0" b="0"/>
+          </a:effectRef>
+          <a:fontRef idx="none"/>
+        </p:style>
+        <p:txBody>
+          <a:bodyPr rot="0" spcFirstLastPara="1" vertOverflow="overflow" horzOverflow="overflow" vert="horz" wrap="square" lIns="50800" tIns="50800" rIns="50800" bIns="50800" numCol="1" spcCol="38100" rtlCol="0" anchor="ctr">
+            <a:spAutoFit/>
+          </a:bodyPr>
+          <a:lstStyle/>
+          <a:p>
+            <a:pPr marR="0" defTabSz="825500" rtl="0" fontAlgn="auto" latinLnBrk="0" hangingPunct="0">
+              <a:lnSpc>
+                <a:spcPct val="100000"/>
+              </a:lnSpc>
+              <a:spcBef>
+                <a:spcPts val="0"/>
+              </a:spcBef>
+              <a:spcAft>
+                <a:spcPts val="0"/>
+              </a:spcAft>
+              <a:buClrTx/>
+              <a:buSzTx/>
+              <a:tabLst/>
+            </a:pPr>
+            <a:r>
+              <a:rPr lang="en-US" sz="9600" dirty="0">
+                <a:solidFill>
+                  <a:schemeClr val="bg2">
+                    <a:lumMod val="90000"/>
+                  </a:schemeClr>
+                </a:solidFill>
+              </a:rPr>
+              <a:t>Wavelength dependence is </a:t>
+            </a:r>
+            <a:r>
+              <a:rPr lang="en-US" sz="9600" dirty="0">
+                <a:solidFill>
+                  <a:schemeClr val="bg1"/>
+                </a:solidFill>
+              </a:rPr>
+              <a:t>material dependent</a:t>
+            </a:r>
+            <a:endParaRPr kumimoji="0" lang="en-US" sz="9600" b="1" i="0" u="none" strike="noStrike" cap="none" spc="0" normalizeH="0" baseline="0" dirty="0">
+              <a:ln>
+                <a:noFill/>
+              </a:ln>
+              <a:solidFill>
+                <a:schemeClr val="bg1"/>
+              </a:solidFill>
+              <a:effectLst/>
+              <a:uFillTx/>
+              <a:latin typeface="Helvetica Neue"/>
+              <a:ea typeface="Helvetica Neue"/>
+              <a:cs typeface="Helvetica Neue"/>
+              <a:sym typeface="Helvetica Neue"/>
+            </a:endParaRPr>
+          </a:p>
+        </p:txBody>
+      </p:sp>
+    </p:spTree>
+    <p:extLst>
+      <p:ext uri="{BB962C8B-B14F-4D97-AF65-F5344CB8AC3E}">
+        <p14:creationId xmlns:p14="http://schemas.microsoft.com/office/powerpoint/2010/main" val="3412067334"/>
+      </p:ext>
+    </p:extLst>
+  </p:cSld>
+  <p:clrMapOvr>
+    <a:masterClrMapping/>
+  </p:clrMapOvr>
+  <p:transition spd="med"/>
+</p:sld>
+</file>
+
+<file path=ppt/slides/slide22.xml><?xml version="1.0" encoding="utf-8"?>
+<p:sld xmlns:a="http://schemas.openxmlformats.org/drawingml/2006/main" xmlns:r="http://schemas.openxmlformats.org/officeDocument/2006/relationships" xmlns:p="http://schemas.openxmlformats.org/presentationml/2006/main">
+  <p:cSld>
+    <p:spTree>
+      <p:nvGrpSpPr>
+        <p:cNvPr id="1" name=""/>
+        <p:cNvGrpSpPr/>
+        <p:nvPr/>
+      </p:nvGrpSpPr>
+      <p:grpSpPr>
+        <a:xfrm>
+          <a:off x="0" y="0"/>
+          <a:ext cx="0" cy="0"/>
+          <a:chOff x="0" y="0"/>
+          <a:chExt cx="0" cy="0"/>
+        </a:xfrm>
+      </p:grpSpPr>
+      <p:sp>
+        <p:nvSpPr>
+          <p:cNvPr id="2" name="TextBox 1">
+            <a:extLst>
+              <a:ext uri="{FF2B5EF4-FFF2-40B4-BE49-F238E27FC236}">
+                <a16:creationId xmlns:a16="http://schemas.microsoft.com/office/drawing/2014/main" id="{F5234184-5221-BCB5-E484-82AF15B925F9}"/>
+              </a:ext>
+            </a:extLst>
+          </p:cNvPr>
+          <p:cNvSpPr txBox="1"/>
+          <p:nvPr/>
+        </p:nvSpPr>
+        <p:spPr>
+          <a:xfrm>
+            <a:off x="2425959" y="1232835"/>
+            <a:ext cx="19532082" cy="1210588"/>
+          </a:xfrm>
+          <a:prstGeom prst="rect">
+            <a:avLst/>
+          </a:prstGeom>
+          <a:noFill/>
+          <a:ln w="12700" cap="flat">
+            <a:noFill/>
+            <a:miter lim="400000"/>
+          </a:ln>
+          <a:effectLst/>
+          <a:sp3d/>
+        </p:spPr>
+        <p:style>
+          <a:lnRef idx="0">
+            <a:scrgbClr r="0" g="0" b="0"/>
+          </a:lnRef>
+          <a:fillRef idx="0">
+            <a:scrgbClr r="0" g="0" b="0"/>
+          </a:fillRef>
+          <a:effectRef idx="0">
+            <a:scrgbClr r="0" g="0" b="0"/>
+          </a:effectRef>
+          <a:fontRef idx="none"/>
+        </p:style>
+        <p:txBody>
+          <a:bodyPr rot="0" spcFirstLastPara="1" vertOverflow="overflow" horzOverflow="overflow" vert="horz" wrap="square" lIns="50800" tIns="50800" rIns="50800" bIns="50800" numCol="1" spcCol="38100" rtlCol="0" anchor="ctr">
+            <a:spAutoFit/>
+          </a:bodyPr>
+          <a:lstStyle/>
+          <a:p>
+            <a:pPr marR="0" algn="l" defTabSz="825500" rtl="0" fontAlgn="auto" latinLnBrk="0" hangingPunct="0">
+              <a:lnSpc>
+                <a:spcPct val="100000"/>
+              </a:lnSpc>
+              <a:spcBef>
+                <a:spcPts val="0"/>
+              </a:spcBef>
+              <a:spcAft>
+                <a:spcPts val="0"/>
+              </a:spcAft>
+              <a:buClrTx/>
+              <a:buSzTx/>
+              <a:tabLst/>
+            </a:pPr>
+            <a:r>
+              <a:rPr kumimoji="0" lang="el-GR" sz="7200" b="1" i="0" u="none" strike="noStrike" cap="none" spc="0" normalizeH="0" baseline="0" dirty="0">
+                <a:ln>
+                  <a:noFill/>
+                </a:ln>
+                <a:solidFill>
+                  <a:schemeClr val="bg2">
+                    <a:lumMod val="90000"/>
+                  </a:schemeClr>
+                </a:solidFill>
+                <a:effectLst/>
+                <a:uFillTx/>
+                <a:latin typeface="Helvetica Neue"/>
+                <a:ea typeface="Helvetica Neue"/>
+                <a:cs typeface="Helvetica Neue"/>
+                <a:sym typeface="Helvetica Neue"/>
+              </a:rPr>
+              <a:t>ε</a:t>
+            </a:r>
+            <a:r>
+              <a:rPr kumimoji="0" lang="en-US" sz="7200" b="1" i="0" u="none" strike="noStrike" cap="none" spc="0" normalizeH="0" baseline="0" dirty="0">
+                <a:ln>
+                  <a:noFill/>
+                </a:ln>
+                <a:solidFill>
+                  <a:schemeClr val="bg2">
+                    <a:lumMod val="90000"/>
+                  </a:schemeClr>
+                </a:solidFill>
+                <a:effectLst/>
+                <a:uFillTx/>
+                <a:latin typeface="Helvetica Neue"/>
+                <a:ea typeface="Helvetica Neue"/>
+                <a:cs typeface="Helvetica Neue"/>
+                <a:sym typeface="Helvetica Neue"/>
+              </a:rPr>
+              <a:t>: emissivity </a:t>
+            </a:r>
+            <a:r>
+              <a:rPr kumimoji="0" lang="en-US" sz="7200" b="1" i="0" u="none" strike="noStrike" cap="none" spc="0" normalizeH="0" baseline="0" dirty="0">
+                <a:ln>
+                  <a:noFill/>
+                </a:ln>
+                <a:solidFill>
+                  <a:schemeClr val="bg1"/>
+                </a:solidFill>
+                <a:effectLst/>
+                <a:uFillTx/>
+                <a:latin typeface="Helvetica Neue"/>
+                <a:ea typeface="Helvetica Neue"/>
+                <a:cs typeface="Helvetica Neue"/>
+                <a:sym typeface="Helvetica Neue"/>
+              </a:rPr>
+              <a:t>can be approximated</a:t>
+            </a:r>
+          </a:p>
+        </p:txBody>
+      </p:sp>
+      <p:sp>
+        <p:nvSpPr>
+          <p:cNvPr id="3" name="Slide Number Placeholder 2">
+            <a:extLst>
+              <a:ext uri="{FF2B5EF4-FFF2-40B4-BE49-F238E27FC236}">
+                <a16:creationId xmlns:a16="http://schemas.microsoft.com/office/drawing/2014/main" id="{A48CADFB-9693-9CE6-D517-DDFF2A6472C3}"/>
+              </a:ext>
+            </a:extLst>
+          </p:cNvPr>
+          <p:cNvSpPr>
+            <a:spLocks noGrp="1"/>
+          </p:cNvSpPr>
+          <p:nvPr>
+            <p:ph type="sldNum" sz="quarter" idx="2"/>
+          </p:nvPr>
+        </p:nvSpPr>
+        <p:spPr/>
+        <p:txBody>
+          <a:bodyPr/>
+          <a:lstStyle/>
+          <a:p>
+            <a:fld id="{86CB4B4D-7CA3-9044-876B-883B54F8677D}" type="slidenum">
+              <a:rPr lang="en-US" smtClean="0"/>
+              <a:t>22</a:t>
+            </a:fld>
+            <a:endParaRPr lang="en-US"/>
+          </a:p>
+        </p:txBody>
+      </p:sp>
+      <p:pic>
+        <p:nvPicPr>
+          <p:cNvPr id="6" name="Picture 5" descr="A black and white symbol&#10;&#10;Description automatically generated">
+            <a:extLst>
+              <a:ext uri="{FF2B5EF4-FFF2-40B4-BE49-F238E27FC236}">
+                <a16:creationId xmlns:a16="http://schemas.microsoft.com/office/drawing/2014/main" id="{B00C50AB-21B7-DB56-2076-F0291EBE3D63}"/>
+              </a:ext>
+            </a:extLst>
+          </p:cNvPr>
+          <p:cNvPicPr>
+            <a:picLocks noChangeAspect="1"/>
+          </p:cNvPicPr>
+          <p:nvPr/>
+        </p:nvPicPr>
+        <p:blipFill>
+          <a:blip r:embed="rId2">
+            <a:extLst>
+              <a:ext uri="{28A0092B-C50C-407E-A947-70E740481C1C}">
+                <a14:useLocalDpi xmlns:a14="http://schemas.microsoft.com/office/drawing/2010/main" val="0"/>
+              </a:ext>
+            </a:extLst>
+          </a:blip>
+          <a:stretch>
+            <a:fillRect/>
+          </a:stretch>
+        </p:blipFill>
+        <p:spPr>
+          <a:xfrm>
+            <a:off x="5200904" y="5708778"/>
+            <a:ext cx="13982192" cy="2298444"/>
+          </a:xfrm>
+          <a:prstGeom prst="rect">
+            <a:avLst/>
+          </a:prstGeom>
+        </p:spPr>
+      </p:pic>
+    </p:spTree>
+    <p:extLst>
+      <p:ext uri="{BB962C8B-B14F-4D97-AF65-F5344CB8AC3E}">
+        <p14:creationId xmlns:p14="http://schemas.microsoft.com/office/powerpoint/2010/main" val="2483746570"/>
+      </p:ext>
+    </p:extLst>
+  </p:cSld>
+  <p:clrMapOvr>
+    <a:masterClrMapping/>
+  </p:clrMapOvr>
+  <p:transition spd="med"/>
+</p:sld>
+</file>
+
+<file path=ppt/slides/slide23.xml><?xml version="1.0" encoding="utf-8"?>
+<p:sld xmlns:a="http://schemas.openxmlformats.org/drawingml/2006/main" xmlns:r="http://schemas.openxmlformats.org/officeDocument/2006/relationships" xmlns:p="http://schemas.openxmlformats.org/presentationml/2006/main">
+  <p:cSld>
+    <p:spTree>
+      <p:nvGrpSpPr>
+        <p:cNvPr id="1" name=""/>
+        <p:cNvGrpSpPr/>
+        <p:nvPr/>
+      </p:nvGrpSpPr>
+      <p:grpSpPr>
+        <a:xfrm>
+          <a:off x="0" y="0"/>
+          <a:ext cx="0" cy="0"/>
+          <a:chOff x="0" y="0"/>
+          <a:chExt cx="0" cy="0"/>
+        </a:xfrm>
+      </p:grpSpPr>
+      <p:sp>
+        <p:nvSpPr>
+          <p:cNvPr id="2" name="TextBox 1">
+            <a:extLst>
+              <a:ext uri="{FF2B5EF4-FFF2-40B4-BE49-F238E27FC236}">
+                <a16:creationId xmlns:a16="http://schemas.microsoft.com/office/drawing/2014/main" id="{F5234184-5221-BCB5-E484-82AF15B925F9}"/>
+              </a:ext>
+            </a:extLst>
+          </p:cNvPr>
+          <p:cNvSpPr txBox="1"/>
+          <p:nvPr/>
+        </p:nvSpPr>
+        <p:spPr>
+          <a:xfrm>
             <a:off x="2425959" y="1048170"/>
             <a:ext cx="19532082" cy="1579920"/>
           </a:xfrm>
@@ -9210,42 +10580,6 @@
           </a:p>
         </p:txBody>
       </p:sp>
-      <p:pic>
-        <p:nvPicPr>
-          <p:cNvPr id="9" name="Picture 8" descr="A close-up of a smiley face&#10;&#10;Description automatically generated">
-            <a:extLst>
-              <a:ext uri="{FF2B5EF4-FFF2-40B4-BE49-F238E27FC236}">
-                <a16:creationId xmlns:a16="http://schemas.microsoft.com/office/drawing/2014/main" id="{4FB5FAFD-C253-A365-ED64-193379C6C94B}"/>
-              </a:ext>
-            </a:extLst>
-          </p:cNvPr>
-          <p:cNvPicPr>
-            <a:picLocks noChangeAspect="1"/>
-          </p:cNvPicPr>
-          <p:nvPr/>
-        </p:nvPicPr>
-        <p:blipFill>
-          <a:blip r:embed="rId2">
-            <a:extLst>
-              <a:ext uri="{28A0092B-C50C-407E-A947-70E740481C1C}">
-                <a14:useLocalDpi xmlns:a14="http://schemas.microsoft.com/office/drawing/2010/main" val="0"/>
-              </a:ext>
-            </a:extLst>
-          </a:blip>
-          <a:stretch>
-            <a:fillRect/>
-          </a:stretch>
-        </p:blipFill>
-        <p:spPr>
-          <a:xfrm>
-            <a:off x="3206125" y="2882355"/>
-            <a:ext cx="17971750" cy="3107898"/>
-          </a:xfrm>
-          <a:prstGeom prst="rect">
-            <a:avLst/>
-          </a:prstGeom>
-        </p:spPr>
-      </p:pic>
       <p:sp>
         <p:nvSpPr>
           <p:cNvPr id="10" name="TextBox 9">
@@ -9342,7 +10676,24 @@
                 <a:cs typeface="Helvetica Neue"/>
                 <a:sym typeface="Helvetica Neue"/>
               </a:rPr>
-              <a:t>: emissivity</a:t>
+              <a:t>: emissivity: </a:t>
+            </a:r>
+            <a:r>
+              <a:rPr kumimoji="0" lang="en-US" sz="7200" b="1" i="0" u="none" strike="noStrike" cap="none" spc="0" normalizeH="0" baseline="0" dirty="0">
+                <a:ln>
+                  <a:noFill/>
+                </a:ln>
+                <a:solidFill>
+                  <a:schemeClr val="bg1"/>
+                </a:solidFill>
+                <a:effectLst/>
+                <a:uFillTx/>
+                <a:latin typeface="Helvetica Neue"/>
+                <a:ea typeface="Helvetica Neue"/>
+                <a:cs typeface="Helvetica Neue"/>
+                <a:sym typeface="Helvetica Neue"/>
+              </a:rPr>
+              <a:t>problem solved!</a:t>
             </a:r>
           </a:p>
           <a:p>
@@ -9366,7 +10717,9 @@
                   <a:noFill/>
                 </a:ln>
                 <a:solidFill>
-                  <a:schemeClr val="bg1"/>
+                  <a:schemeClr val="bg2">
+                    <a:lumMod val="90000"/>
+                  </a:schemeClr>
                 </a:solidFill>
                 <a:effectLst/>
                 <a:uFillTx/>
@@ -9380,10 +10733,69 @@
           </a:p>
         </p:txBody>
       </p:sp>
+      <p:sp>
+        <p:nvSpPr>
+          <p:cNvPr id="3" name="Slide Number Placeholder 2">
+            <a:extLst>
+              <a:ext uri="{FF2B5EF4-FFF2-40B4-BE49-F238E27FC236}">
+                <a16:creationId xmlns:a16="http://schemas.microsoft.com/office/drawing/2014/main" id="{A48CADFB-9693-9CE6-D517-DDFF2A6472C3}"/>
+              </a:ext>
+            </a:extLst>
+          </p:cNvPr>
+          <p:cNvSpPr>
+            <a:spLocks noGrp="1"/>
+          </p:cNvSpPr>
+          <p:nvPr>
+            <p:ph type="sldNum" sz="quarter" idx="2"/>
+          </p:nvPr>
+        </p:nvSpPr>
+        <p:spPr/>
+        <p:txBody>
+          <a:bodyPr/>
+          <a:lstStyle/>
+          <a:p>
+            <a:fld id="{86CB4B4D-7CA3-9044-876B-883B54F8677D}" type="slidenum">
+              <a:rPr lang="en-US" smtClean="0"/>
+              <a:t>23</a:t>
+            </a:fld>
+            <a:endParaRPr lang="en-US"/>
+          </a:p>
+        </p:txBody>
+      </p:sp>
+      <p:pic>
+        <p:nvPicPr>
+          <p:cNvPr id="4" name="Picture 3">
+            <a:extLst>
+              <a:ext uri="{FF2B5EF4-FFF2-40B4-BE49-F238E27FC236}">
+                <a16:creationId xmlns:a16="http://schemas.microsoft.com/office/drawing/2014/main" id="{38C25F56-7947-1D16-8C4D-1D2A099EA57C}"/>
+              </a:ext>
+            </a:extLst>
+          </p:cNvPr>
+          <p:cNvPicPr>
+            <a:picLocks noChangeAspect="1"/>
+          </p:cNvPicPr>
+          <p:nvPr/>
+        </p:nvPicPr>
+        <p:blipFill>
+          <a:blip r:embed="rId3"/>
+          <a:stretch>
+            <a:fillRect/>
+          </a:stretch>
+        </p:blipFill>
+        <p:spPr>
+          <a:xfrm>
+            <a:off x="2468205" y="3242462"/>
+            <a:ext cx="19447590" cy="2364492"/>
+          </a:xfrm>
+          <a:prstGeom prst="rect">
+            <a:avLst/>
+          </a:prstGeom>
+        </p:spPr>
+      </p:pic>
     </p:spTree>
     <p:extLst>
       <p:ext uri="{BB962C8B-B14F-4D97-AF65-F5344CB8AC3E}">
-        <p14:creationId xmlns:p14="http://schemas.microsoft.com/office/powerpoint/2010/main" val="2476073459"/>
+        <p14:creationId xmlns:p14="http://schemas.microsoft.com/office/powerpoint/2010/main" val="4195215044"/>
       </p:ext>
     </p:extLst>
   </p:cSld>
@@ -9394,7 +10806,7 @@
 </p:sld>
 </file>
 
-<file path=ppt/slides/slide21.xml><?xml version="1.0" encoding="utf-8"?>
+<file path=ppt/slides/slide24.xml><?xml version="1.0" encoding="utf-8"?>
 <p:sld xmlns:a="http://schemas.openxmlformats.org/drawingml/2006/main" xmlns:r="http://schemas.openxmlformats.org/officeDocument/2006/relationships" xmlns:p="http://schemas.openxmlformats.org/presentationml/2006/main">
   <p:cSld>
     <p:spTree>
@@ -9411,6 +10823,35 @@
           <a:chExt cx="0" cy="0"/>
         </a:xfrm>
       </p:grpSpPr>
+      <p:sp>
+        <p:nvSpPr>
+          <p:cNvPr id="2" name="Slide Number Placeholder 1">
+            <a:extLst>
+              <a:ext uri="{FF2B5EF4-FFF2-40B4-BE49-F238E27FC236}">
+                <a16:creationId xmlns:a16="http://schemas.microsoft.com/office/drawing/2014/main" id="{1DBF4B39-FE57-971F-0D76-18693B85BD37}"/>
+              </a:ext>
+            </a:extLst>
+          </p:cNvPr>
+          <p:cNvSpPr>
+            <a:spLocks noGrp="1"/>
+          </p:cNvSpPr>
+          <p:nvPr>
+            <p:ph type="sldNum" sz="quarter" idx="2"/>
+          </p:nvPr>
+        </p:nvSpPr>
+        <p:spPr/>
+        <p:txBody>
+          <a:bodyPr/>
+          <a:lstStyle/>
+          <a:p>
+            <a:fld id="{86CB4B4D-7CA3-9044-876B-883B54F8677D}" type="slidenum">
+              <a:rPr lang="en-US" smtClean="0"/>
+              <a:t>24</a:t>
+            </a:fld>
+            <a:endParaRPr lang="en-US"/>
+          </a:p>
+        </p:txBody>
+      </p:sp>
     </p:spTree>
     <p:extLst>
       <p:ext uri="{BB962C8B-B14F-4D97-AF65-F5344CB8AC3E}">
@@ -9638,6 +11079,35 @@
               <a:cs typeface="Helvetica Neue"/>
               <a:sym typeface="Helvetica Neue"/>
             </a:endParaRPr>
+          </a:p>
+        </p:txBody>
+      </p:sp>
+      <p:sp>
+        <p:nvSpPr>
+          <p:cNvPr id="3" name="Slide Number Placeholder 2">
+            <a:extLst>
+              <a:ext uri="{FF2B5EF4-FFF2-40B4-BE49-F238E27FC236}">
+                <a16:creationId xmlns:a16="http://schemas.microsoft.com/office/drawing/2014/main" id="{8510F682-3F11-DAEE-0C21-0355A62EA45C}"/>
+              </a:ext>
+            </a:extLst>
+          </p:cNvPr>
+          <p:cNvSpPr>
+            <a:spLocks noGrp="1"/>
+          </p:cNvSpPr>
+          <p:nvPr>
+            <p:ph type="sldNum" sz="quarter" idx="2"/>
+          </p:nvPr>
+        </p:nvSpPr>
+        <p:spPr/>
+        <p:txBody>
+          <a:bodyPr/>
+          <a:lstStyle/>
+          <a:p>
+            <a:fld id="{86CB4B4D-7CA3-9044-876B-883B54F8677D}" type="slidenum">
+              <a:rPr lang="en-US" smtClean="0"/>
+              <a:t>3</a:t>
+            </a:fld>
+            <a:endParaRPr lang="en-US"/>
           </a:p>
         </p:txBody>
       </p:sp>
@@ -9773,6 +11243,35 @@
           </a:p>
         </p:txBody>
       </p:sp>
+      <p:sp>
+        <p:nvSpPr>
+          <p:cNvPr id="2" name="Slide Number Placeholder 1">
+            <a:extLst>
+              <a:ext uri="{FF2B5EF4-FFF2-40B4-BE49-F238E27FC236}">
+                <a16:creationId xmlns:a16="http://schemas.microsoft.com/office/drawing/2014/main" id="{A302C60B-CF1C-BF2E-D38F-B159041E307B}"/>
+              </a:ext>
+            </a:extLst>
+          </p:cNvPr>
+          <p:cNvSpPr>
+            <a:spLocks noGrp="1"/>
+          </p:cNvSpPr>
+          <p:nvPr>
+            <p:ph type="sldNum" sz="quarter" idx="2"/>
+          </p:nvPr>
+        </p:nvSpPr>
+        <p:spPr/>
+        <p:txBody>
+          <a:bodyPr/>
+          <a:lstStyle/>
+          <a:p>
+            <a:fld id="{86CB4B4D-7CA3-9044-876B-883B54F8677D}" type="slidenum">
+              <a:rPr lang="en-US" smtClean="0"/>
+              <a:t>4</a:t>
+            </a:fld>
+            <a:endParaRPr lang="en-US"/>
+          </a:p>
+        </p:txBody>
+      </p:sp>
     </p:spTree>
     <p:extLst>
       <p:ext uri="{BB962C8B-B14F-4D97-AF65-F5344CB8AC3E}">
@@ -9908,6 +11407,35 @@
           </a:p>
         </p:txBody>
       </p:sp>
+      <p:sp>
+        <p:nvSpPr>
+          <p:cNvPr id="3" name="Slide Number Placeholder 2">
+            <a:extLst>
+              <a:ext uri="{FF2B5EF4-FFF2-40B4-BE49-F238E27FC236}">
+                <a16:creationId xmlns:a16="http://schemas.microsoft.com/office/drawing/2014/main" id="{323F4A4F-4950-9F16-691E-0F5FAA978AD4}"/>
+              </a:ext>
+            </a:extLst>
+          </p:cNvPr>
+          <p:cNvSpPr>
+            <a:spLocks noGrp="1"/>
+          </p:cNvSpPr>
+          <p:nvPr>
+            <p:ph type="sldNum" sz="quarter" idx="2"/>
+          </p:nvPr>
+        </p:nvSpPr>
+        <p:spPr/>
+        <p:txBody>
+          <a:bodyPr/>
+          <a:lstStyle/>
+          <a:p>
+            <a:fld id="{86CB4B4D-7CA3-9044-876B-883B54F8677D}" type="slidenum">
+              <a:rPr lang="en-US" smtClean="0"/>
+              <a:t>5</a:t>
+            </a:fld>
+            <a:endParaRPr lang="en-US"/>
+          </a:p>
+        </p:txBody>
+      </p:sp>
     </p:spTree>
     <p:extLst>
       <p:ext uri="{BB962C8B-B14F-4D97-AF65-F5344CB8AC3E}">
@@ -10063,8 +11591,8 @@
         </p:nvSpPr>
         <p:spPr>
           <a:xfrm flipH="1">
-            <a:off x="3219059" y="4590712"/>
-            <a:ext cx="17945882" cy="4534575"/>
+            <a:off x="3219059" y="5698708"/>
+            <a:ext cx="17945882" cy="2318583"/>
           </a:xfrm>
           <a:prstGeom prst="rect">
             <a:avLst/>
@@ -10152,72 +11680,7 @@
                   </a:schemeClr>
                 </a:solidFill>
               </a:rPr>
-              <a:t>Funnel infrared radiation into detector</a:t>
-            </a:r>
-          </a:p>
-          <a:p>
-            <a:pPr marL="857250" marR="0" indent="-857250" algn="l" defTabSz="825500" rtl="0" fontAlgn="auto" latinLnBrk="0" hangingPunct="0">
-              <a:lnSpc>
-                <a:spcPct val="100000"/>
-              </a:lnSpc>
-              <a:spcBef>
-                <a:spcPts val="0"/>
-              </a:spcBef>
-              <a:spcAft>
-                <a:spcPts val="0"/>
-              </a:spcAft>
-              <a:buClrTx/>
-              <a:buSzTx/>
-              <a:buFont typeface="Arial" panose="020B0604020202020204" pitchFamily="34" charset="0"/>
-              <a:buChar char="•"/>
-              <a:tabLst/>
-            </a:pPr>
-            <a:r>
-              <a:rPr kumimoji="0" lang="en-US" sz="7200" b="1" i="0" u="none" strike="noStrike" cap="none" spc="0" normalizeH="0" baseline="0" dirty="0">
-                <a:ln>
-                  <a:noFill/>
-                </a:ln>
-                <a:solidFill>
-                  <a:schemeClr val="bg2">
-                    <a:lumMod val="90000"/>
-                  </a:schemeClr>
-                </a:solidFill>
-                <a:effectLst/>
-                <a:uFillTx/>
-                <a:latin typeface="Helvetica Neue"/>
-                <a:ea typeface="Helvetica Neue"/>
-                <a:cs typeface="Helvetica Neue"/>
-                <a:sym typeface="Helvetica Neue"/>
-              </a:rPr>
-              <a:t>Measure incoming intensity</a:t>
-            </a:r>
-          </a:p>
-          <a:p>
-            <a:pPr marL="857250" marR="0" indent="-857250" algn="l" defTabSz="825500" rtl="0" fontAlgn="auto" latinLnBrk="0" hangingPunct="0">
-              <a:lnSpc>
-                <a:spcPct val="100000"/>
-              </a:lnSpc>
-              <a:spcBef>
-                <a:spcPts val="0"/>
-              </a:spcBef>
-              <a:spcAft>
-                <a:spcPts val="0"/>
-              </a:spcAft>
-              <a:buClrTx/>
-              <a:buSzTx/>
-              <a:buFont typeface="Arial" panose="020B0604020202020204" pitchFamily="34" charset="0"/>
-              <a:buChar char="•"/>
-              <a:tabLst/>
-            </a:pPr>
-            <a:r>
-              <a:rPr lang="en-US" sz="7200" dirty="0">
-                <a:solidFill>
-                  <a:schemeClr val="bg2">
-                    <a:lumMod val="90000"/>
-                  </a:schemeClr>
-                </a:solidFill>
-              </a:rPr>
-              <a:t>Calculate temperature</a:t>
+              <a:t>Infrared radiation -&gt; temperature</a:t>
             </a:r>
             <a:endParaRPr kumimoji="0" lang="en-US" sz="7200" b="1" i="0" u="none" strike="noStrike" cap="none" spc="0" normalizeH="0" baseline="0" dirty="0">
               <a:ln>
@@ -10238,10 +11701,39 @@
           </a:p>
         </p:txBody>
       </p:sp>
+      <p:sp>
+        <p:nvSpPr>
+          <p:cNvPr id="4" name="Slide Number Placeholder 3">
+            <a:extLst>
+              <a:ext uri="{FF2B5EF4-FFF2-40B4-BE49-F238E27FC236}">
+                <a16:creationId xmlns:a16="http://schemas.microsoft.com/office/drawing/2014/main" id="{BE6C8333-26F6-A0EE-45F0-6DE3ABF0ECF1}"/>
+              </a:ext>
+            </a:extLst>
+          </p:cNvPr>
+          <p:cNvSpPr>
+            <a:spLocks noGrp="1"/>
+          </p:cNvSpPr>
+          <p:nvPr>
+            <p:ph type="sldNum" sz="quarter" idx="2"/>
+          </p:nvPr>
+        </p:nvSpPr>
+        <p:spPr/>
+        <p:txBody>
+          <a:bodyPr/>
+          <a:lstStyle/>
+          <a:p>
+            <a:fld id="{86CB4B4D-7CA3-9044-876B-883B54F8677D}" type="slidenum">
+              <a:rPr lang="en-US" smtClean="0"/>
+              <a:t>6</a:t>
+            </a:fld>
+            <a:endParaRPr lang="en-US"/>
+          </a:p>
+        </p:txBody>
+      </p:sp>
     </p:spTree>
     <p:extLst>
       <p:ext uri="{BB962C8B-B14F-4D97-AF65-F5344CB8AC3E}">
-        <p14:creationId xmlns:p14="http://schemas.microsoft.com/office/powerpoint/2010/main" val="550332612"/>
+        <p14:creationId xmlns:p14="http://schemas.microsoft.com/office/powerpoint/2010/main" val="2912360036"/>
       </p:ext>
     </p:extLst>
   </p:cSld>
@@ -10393,8 +11885,8 @@
         </p:nvSpPr>
         <p:spPr>
           <a:xfrm flipH="1">
-            <a:off x="3219059" y="4590712"/>
-            <a:ext cx="17945882" cy="4534575"/>
+            <a:off x="3219059" y="5698708"/>
+            <a:ext cx="17945882" cy="2318583"/>
           </a:xfrm>
           <a:prstGeom prst="rect">
             <a:avLst/>
@@ -10482,72 +11974,7 @@
                   <a:schemeClr val="bg1"/>
                 </a:solidFill>
               </a:rPr>
-              <a:t>Funnel infrared radiation into detector</a:t>
-            </a:r>
-          </a:p>
-          <a:p>
-            <a:pPr marL="857250" marR="0" indent="-857250" algn="l" defTabSz="825500" rtl="0" fontAlgn="auto" latinLnBrk="0" hangingPunct="0">
-              <a:lnSpc>
-                <a:spcPct val="100000"/>
-              </a:lnSpc>
-              <a:spcBef>
-                <a:spcPts val="0"/>
-              </a:spcBef>
-              <a:spcAft>
-                <a:spcPts val="0"/>
-              </a:spcAft>
-              <a:buClrTx/>
-              <a:buSzTx/>
-              <a:buFont typeface="Arial" panose="020B0604020202020204" pitchFamily="34" charset="0"/>
-              <a:buChar char="•"/>
-              <a:tabLst/>
-            </a:pPr>
-            <a:r>
-              <a:rPr kumimoji="0" lang="en-US" sz="7200" b="1" i="0" u="none" strike="noStrike" cap="none" spc="0" normalizeH="0" baseline="0" dirty="0">
-                <a:ln>
-                  <a:noFill/>
-                </a:ln>
-                <a:solidFill>
-                  <a:schemeClr val="bg2">
-                    <a:lumMod val="90000"/>
-                  </a:schemeClr>
-                </a:solidFill>
-                <a:effectLst/>
-                <a:uFillTx/>
-                <a:latin typeface="Helvetica Neue"/>
-                <a:ea typeface="Helvetica Neue"/>
-                <a:cs typeface="Helvetica Neue"/>
-                <a:sym typeface="Helvetica Neue"/>
-              </a:rPr>
-              <a:t>Measure incoming intensity</a:t>
-            </a:r>
-          </a:p>
-          <a:p>
-            <a:pPr marL="857250" marR="0" indent="-857250" algn="l" defTabSz="825500" rtl="0" fontAlgn="auto" latinLnBrk="0" hangingPunct="0">
-              <a:lnSpc>
-                <a:spcPct val="100000"/>
-              </a:lnSpc>
-              <a:spcBef>
-                <a:spcPts val="0"/>
-              </a:spcBef>
-              <a:spcAft>
-                <a:spcPts val="0"/>
-              </a:spcAft>
-              <a:buClrTx/>
-              <a:buSzTx/>
-              <a:buFont typeface="Arial" panose="020B0604020202020204" pitchFamily="34" charset="0"/>
-              <a:buChar char="•"/>
-              <a:tabLst/>
-            </a:pPr>
-            <a:r>
-              <a:rPr lang="en-US" sz="7200" dirty="0">
-                <a:solidFill>
-                  <a:schemeClr val="bg2">
-                    <a:lumMod val="90000"/>
-                  </a:schemeClr>
-                </a:solidFill>
-              </a:rPr>
-              <a:t>Calculate temperature</a:t>
+              <a:t>Infrared radiation -&gt; temperature</a:t>
             </a:r>
             <a:endParaRPr kumimoji="0" lang="en-US" sz="7200" b="1" i="0" u="none" strike="noStrike" cap="none" spc="0" normalizeH="0" baseline="0" dirty="0">
               <a:ln>
@@ -10568,10 +11995,39 @@
           </a:p>
         </p:txBody>
       </p:sp>
+      <p:sp>
+        <p:nvSpPr>
+          <p:cNvPr id="4" name="Slide Number Placeholder 3">
+            <a:extLst>
+              <a:ext uri="{FF2B5EF4-FFF2-40B4-BE49-F238E27FC236}">
+                <a16:creationId xmlns:a16="http://schemas.microsoft.com/office/drawing/2014/main" id="{BAD4529E-98E3-2D4D-4488-5F07638C6CA1}"/>
+              </a:ext>
+            </a:extLst>
+          </p:cNvPr>
+          <p:cNvSpPr>
+            <a:spLocks noGrp="1"/>
+          </p:cNvSpPr>
+          <p:nvPr>
+            <p:ph type="sldNum" sz="quarter" idx="2"/>
+          </p:nvPr>
+        </p:nvSpPr>
+        <p:spPr/>
+        <p:txBody>
+          <a:bodyPr/>
+          <a:lstStyle/>
+          <a:p>
+            <a:fld id="{86CB4B4D-7CA3-9044-876B-883B54F8677D}" type="slidenum">
+              <a:rPr lang="en-US" smtClean="0"/>
+              <a:t>7</a:t>
+            </a:fld>
+            <a:endParaRPr lang="en-US"/>
+          </a:p>
+        </p:txBody>
+      </p:sp>
     </p:spTree>
     <p:extLst>
       <p:ext uri="{BB962C8B-B14F-4D97-AF65-F5344CB8AC3E}">
-        <p14:creationId xmlns:p14="http://schemas.microsoft.com/office/powerpoint/2010/main" val="2912360036"/>
+        <p14:creationId xmlns:p14="http://schemas.microsoft.com/office/powerpoint/2010/main" val="1464975707"/>
       </p:ext>
     </p:extLst>
   </p:cSld>
@@ -10604,7 +12060,7 @@
           <p:cNvPr id="2" name="TextBox 1">
             <a:extLst>
               <a:ext uri="{FF2B5EF4-FFF2-40B4-BE49-F238E27FC236}">
-                <a16:creationId xmlns:a16="http://schemas.microsoft.com/office/drawing/2014/main" id="{025EF489-6E4D-3BCF-842D-9E13137B13CB}"/>
+                <a16:creationId xmlns:a16="http://schemas.microsoft.com/office/drawing/2014/main" id="{F5234184-5221-BCB5-E484-82AF15B925F9}"/>
               </a:ext>
             </a:extLst>
           </p:cNvPr>
@@ -10613,8 +12069,8 @@
         </p:nvSpPr>
         <p:spPr>
           <a:xfrm>
-            <a:off x="385665" y="1048170"/>
-            <a:ext cx="23612670" cy="1579920"/>
+            <a:off x="2425959" y="1048170"/>
+            <a:ext cx="19532082" cy="1579920"/>
           </a:xfrm>
           <a:prstGeom prst="rect">
             <a:avLst/>
@@ -10667,179 +12123,6 @@
                   <a:noFill/>
                 </a:ln>
                 <a:solidFill>
-                  <a:schemeClr val="bg2">
-                    <a:lumMod val="90000"/>
-                  </a:schemeClr>
-                </a:solidFill>
-                <a:effectLst/>
-                <a:uFillTx/>
-                <a:latin typeface="Helvetica Neue"/>
-                <a:ea typeface="Helvetica Neue"/>
-                <a:cs typeface="Helvetica Neue"/>
-                <a:sym typeface="Helvetica Neue"/>
-              </a:rPr>
-              <a:t>Pyrometry: </a:t>
-            </a:r>
-            <a:r>
-              <a:rPr lang="en-US" sz="9600" dirty="0">
-                <a:solidFill>
-                  <a:schemeClr val="bg2">
-                    <a:lumMod val="90000"/>
-                  </a:schemeClr>
-                </a:solidFill>
-              </a:rPr>
-              <a:t>Temperature from Radiation</a:t>
-            </a:r>
-            <a:endParaRPr kumimoji="0" lang="en-US" sz="9600" b="1" i="0" u="none" strike="noStrike" cap="none" spc="0" normalizeH="0" baseline="0" dirty="0">
-              <a:ln>
-                <a:noFill/>
-              </a:ln>
-              <a:solidFill>
-                <a:schemeClr val="bg2">
-                  <a:lumMod val="90000"/>
-                </a:schemeClr>
-              </a:solidFill>
-              <a:effectLst/>
-              <a:uFillTx/>
-              <a:latin typeface="Helvetica Neue"/>
-              <a:ea typeface="Helvetica Neue"/>
-              <a:cs typeface="Helvetica Neue"/>
-              <a:sym typeface="Helvetica Neue"/>
-            </a:endParaRPr>
-          </a:p>
-        </p:txBody>
-      </p:sp>
-      <p:sp>
-        <p:nvSpPr>
-          <p:cNvPr id="3" name="TextBox 2">
-            <a:extLst>
-              <a:ext uri="{FF2B5EF4-FFF2-40B4-BE49-F238E27FC236}">
-                <a16:creationId xmlns:a16="http://schemas.microsoft.com/office/drawing/2014/main" id="{0E9113CE-1959-3A80-53F4-B720B1E73BAC}"/>
-              </a:ext>
-            </a:extLst>
-          </p:cNvPr>
-          <p:cNvSpPr txBox="1"/>
-          <p:nvPr/>
-        </p:nvSpPr>
-        <p:spPr>
-          <a:xfrm flipH="1">
-            <a:off x="3219059" y="4590712"/>
-            <a:ext cx="17945882" cy="4534575"/>
-          </a:xfrm>
-          <a:prstGeom prst="rect">
-            <a:avLst/>
-          </a:prstGeom>
-          <a:noFill/>
-          <a:ln w="12700" cap="flat">
-            <a:noFill/>
-            <a:miter lim="400000"/>
-          </a:ln>
-          <a:effectLst/>
-          <a:sp3d/>
-        </p:spPr>
-        <p:style>
-          <a:lnRef idx="0">
-            <a:scrgbClr r="0" g="0" b="0"/>
-          </a:lnRef>
-          <a:fillRef idx="0">
-            <a:scrgbClr r="0" g="0" b="0"/>
-          </a:fillRef>
-          <a:effectRef idx="0">
-            <a:scrgbClr r="0" g="0" b="0"/>
-          </a:effectRef>
-          <a:fontRef idx="none"/>
-        </p:style>
-        <p:txBody>
-          <a:bodyPr rot="0" spcFirstLastPara="1" vertOverflow="overflow" horzOverflow="overflow" vert="horz" wrap="square" lIns="50800" tIns="50800" rIns="50800" bIns="50800" numCol="1" spcCol="38100" rtlCol="0" anchor="ctr">
-            <a:spAutoFit/>
-          </a:bodyPr>
-          <a:lstStyle/>
-          <a:p>
-            <a:pPr marR="0" algn="l" defTabSz="825500" rtl="0" fontAlgn="auto" latinLnBrk="0" hangingPunct="0">
-              <a:lnSpc>
-                <a:spcPct val="100000"/>
-              </a:lnSpc>
-              <a:spcBef>
-                <a:spcPts val="0"/>
-              </a:spcBef>
-              <a:spcAft>
-                <a:spcPts val="0"/>
-              </a:spcAft>
-              <a:buClrTx/>
-              <a:buSzTx/>
-              <a:tabLst/>
-            </a:pPr>
-            <a:r>
-              <a:rPr kumimoji="0" lang="en-US" sz="7200" b="1" i="0" u="none" strike="noStrike" cap="none" spc="0" normalizeH="0" baseline="0" dirty="0">
-                <a:ln>
-                  <a:noFill/>
-                </a:ln>
-                <a:solidFill>
-                  <a:schemeClr val="bg2">
-                    <a:lumMod val="90000"/>
-                  </a:schemeClr>
-                </a:solidFill>
-                <a:effectLst/>
-                <a:uFillTx/>
-                <a:latin typeface="Helvetica Neue"/>
-                <a:ea typeface="Helvetica Neue"/>
-                <a:cs typeface="Helvetica Neue"/>
-                <a:sym typeface="Helvetica Neue"/>
-              </a:rPr>
-              <a:t>Infrared Pyrometers:</a:t>
-            </a:r>
-          </a:p>
-          <a:p>
-            <a:pPr marL="857250" marR="0" indent="-857250" algn="l" defTabSz="825500" rtl="0" fontAlgn="auto" latinLnBrk="0" hangingPunct="0">
-              <a:lnSpc>
-                <a:spcPct val="100000"/>
-              </a:lnSpc>
-              <a:spcBef>
-                <a:spcPts val="0"/>
-              </a:spcBef>
-              <a:spcAft>
-                <a:spcPts val="0"/>
-              </a:spcAft>
-              <a:buClrTx/>
-              <a:buSzTx/>
-              <a:buFont typeface="Arial" panose="020B0604020202020204" pitchFamily="34" charset="0"/>
-              <a:buChar char="•"/>
-              <a:tabLst/>
-            </a:pPr>
-            <a:r>
-              <a:rPr lang="en-US" sz="7200" dirty="0">
-                <a:solidFill>
-                  <a:schemeClr val="bg2">
-                    <a:lumMod val="90000"/>
-                  </a:schemeClr>
-                </a:solidFill>
-              </a:rPr>
-              <a:t>Funnel infrared radiation into detector</a:t>
-            </a:r>
-          </a:p>
-          <a:p>
-            <a:pPr marL="857250" marR="0" indent="-857250" algn="l" defTabSz="825500" rtl="0" fontAlgn="auto" latinLnBrk="0" hangingPunct="0">
-              <a:lnSpc>
-                <a:spcPct val="100000"/>
-              </a:lnSpc>
-              <a:spcBef>
-                <a:spcPts val="0"/>
-              </a:spcBef>
-              <a:spcAft>
-                <a:spcPts val="0"/>
-              </a:spcAft>
-              <a:buClrTx/>
-              <a:buSzTx/>
-              <a:buFont typeface="Arial" panose="020B0604020202020204" pitchFamily="34" charset="0"/>
-              <a:buChar char="•"/>
-              <a:tabLst/>
-            </a:pPr>
-            <a:r>
-              <a:rPr kumimoji="0" lang="en-US" sz="7200" b="1" i="0" u="none" strike="noStrike" cap="none" spc="0" normalizeH="0" baseline="0" dirty="0">
-                <a:ln>
-                  <a:noFill/>
-                </a:ln>
-                <a:solidFill>
                   <a:schemeClr val="bg1"/>
                 </a:solidFill>
                 <a:effectLst/>
@@ -10849,59 +12132,44 @@
                 <a:cs typeface="Helvetica Neue"/>
                 <a:sym typeface="Helvetica Neue"/>
               </a:rPr>
-              <a:t>Measure incoming intensity</a:t>
-            </a:r>
-          </a:p>
-          <a:p>
-            <a:pPr marL="857250" marR="0" indent="-857250" algn="l" defTabSz="825500" rtl="0" fontAlgn="auto" latinLnBrk="0" hangingPunct="0">
-              <a:lnSpc>
-                <a:spcPct val="100000"/>
-              </a:lnSpc>
-              <a:spcBef>
-                <a:spcPts val="0"/>
-              </a:spcBef>
-              <a:spcAft>
-                <a:spcPts val="0"/>
-              </a:spcAft>
-              <a:buClrTx/>
-              <a:buSzTx/>
-              <a:buFont typeface="Arial" panose="020B0604020202020204" pitchFamily="34" charset="0"/>
-              <a:buChar char="•"/>
-              <a:tabLst/>
-            </a:pPr>
-            <a:r>
-              <a:rPr lang="en-US" sz="7200" dirty="0">
-                <a:solidFill>
-                  <a:schemeClr val="bg2">
-                    <a:lumMod val="90000"/>
-                  </a:schemeClr>
-                </a:solidFill>
-              </a:rPr>
-              <a:t>Calculate temperature</a:t>
-            </a:r>
-            <a:endParaRPr kumimoji="0" lang="en-US" sz="7200" b="1" i="0" u="none" strike="noStrike" cap="none" spc="0" normalizeH="0" baseline="0" dirty="0">
-              <a:ln>
-                <a:noFill/>
-              </a:ln>
-              <a:solidFill>
-                <a:schemeClr val="bg2">
-                  <a:lumMod val="90000"/>
-                </a:schemeClr>
-              </a:solidFill>
-              <a:effectLst/>
-              <a:uFillTx/>
-              <a:latin typeface="Helvetica Neue"/>
-              <a:ea typeface="Helvetica Neue"/>
-              <a:cs typeface="Helvetica Neue"/>
-              <a:sym typeface="Helvetica Neue"/>
-            </a:endParaRPr>
+              <a:t>Measuring more than Infrared</a:t>
+            </a:r>
+          </a:p>
+        </p:txBody>
+      </p:sp>
+      <p:sp>
+        <p:nvSpPr>
+          <p:cNvPr id="3" name="Slide Number Placeholder 2">
+            <a:extLst>
+              <a:ext uri="{FF2B5EF4-FFF2-40B4-BE49-F238E27FC236}">
+                <a16:creationId xmlns:a16="http://schemas.microsoft.com/office/drawing/2014/main" id="{75C2DA7C-F80E-8916-23B8-7D093B9A68F1}"/>
+              </a:ext>
+            </a:extLst>
+          </p:cNvPr>
+          <p:cNvSpPr>
+            <a:spLocks noGrp="1"/>
+          </p:cNvSpPr>
+          <p:nvPr>
+            <p:ph type="sldNum" sz="quarter" idx="2"/>
+          </p:nvPr>
+        </p:nvSpPr>
+        <p:spPr/>
+        <p:txBody>
+          <a:bodyPr/>
+          <a:lstStyle/>
+          <a:p>
+            <a:fld id="{86CB4B4D-7CA3-9044-876B-883B54F8677D}" type="slidenum">
+              <a:rPr lang="en-US" smtClean="0"/>
+              <a:t>8</a:t>
+            </a:fld>
+            <a:endParaRPr lang="en-US"/>
           </a:p>
         </p:txBody>
       </p:sp>
     </p:spTree>
     <p:extLst>
       <p:ext uri="{BB962C8B-B14F-4D97-AF65-F5344CB8AC3E}">
-        <p14:creationId xmlns:p14="http://schemas.microsoft.com/office/powerpoint/2010/main" val="1051086629"/>
+        <p14:creationId xmlns:p14="http://schemas.microsoft.com/office/powerpoint/2010/main" val="1338275189"/>
       </p:ext>
     </p:extLst>
   </p:cSld>
@@ -10934,7 +12202,7 @@
           <p:cNvPr id="2" name="TextBox 1">
             <a:extLst>
               <a:ext uri="{FF2B5EF4-FFF2-40B4-BE49-F238E27FC236}">
-                <a16:creationId xmlns:a16="http://schemas.microsoft.com/office/drawing/2014/main" id="{025EF489-6E4D-3BCF-842D-9E13137B13CB}"/>
+                <a16:creationId xmlns:a16="http://schemas.microsoft.com/office/drawing/2014/main" id="{F5234184-5221-BCB5-E484-82AF15B925F9}"/>
               </a:ext>
             </a:extLst>
           </p:cNvPr>
@@ -10943,8 +12211,8 @@
         </p:nvSpPr>
         <p:spPr>
           <a:xfrm>
-            <a:off x="385665" y="1048170"/>
-            <a:ext cx="23612670" cy="1579920"/>
+            <a:off x="2425959" y="1048170"/>
+            <a:ext cx="19532082" cy="1579920"/>
           </a:xfrm>
           <a:prstGeom prst="rect">
             <a:avLst/>
@@ -11008,43 +12276,17 @@
                 <a:cs typeface="Helvetica Neue"/>
                 <a:sym typeface="Helvetica Neue"/>
               </a:rPr>
-              <a:t>Pyrometry: </a:t>
-            </a:r>
-            <a:r>
-              <a:rPr lang="en-US" sz="9600" dirty="0">
-                <a:solidFill>
-                  <a:schemeClr val="bg2">
-                    <a:lumMod val="90000"/>
-                  </a:schemeClr>
-                </a:solidFill>
-              </a:rPr>
-              <a:t>Temperature from Radiation</a:t>
-            </a:r>
-            <a:endParaRPr kumimoji="0" lang="en-US" sz="9600" b="1" i="0" u="none" strike="noStrike" cap="none" spc="0" normalizeH="0" baseline="0" dirty="0">
-              <a:ln>
-                <a:noFill/>
-              </a:ln>
-              <a:solidFill>
-                <a:schemeClr val="bg2">
-                  <a:lumMod val="90000"/>
-                </a:schemeClr>
-              </a:solidFill>
-              <a:effectLst/>
-              <a:uFillTx/>
-              <a:latin typeface="Helvetica Neue"/>
-              <a:ea typeface="Helvetica Neue"/>
-              <a:cs typeface="Helvetica Neue"/>
-              <a:sym typeface="Helvetica Neue"/>
-            </a:endParaRPr>
-          </a:p>
-        </p:txBody>
-      </p:sp>
-      <p:sp>
-        <p:nvSpPr>
-          <p:cNvPr id="3" name="TextBox 2">
+              <a:t>Measuring more than Infrared</a:t>
+            </a:r>
+          </a:p>
+        </p:txBody>
+      </p:sp>
+      <p:sp>
+        <p:nvSpPr>
+          <p:cNvPr id="4" name="TextBox 3">
             <a:extLst>
               <a:ext uri="{FF2B5EF4-FFF2-40B4-BE49-F238E27FC236}">
-                <a16:creationId xmlns:a16="http://schemas.microsoft.com/office/drawing/2014/main" id="{0E9113CE-1959-3A80-53F4-B720B1E73BAC}"/>
+                <a16:creationId xmlns:a16="http://schemas.microsoft.com/office/drawing/2014/main" id="{E60F9A97-FA66-A5E7-6D61-C1A428C7659A}"/>
               </a:ext>
             </a:extLst>
           </p:cNvPr>
@@ -11052,9 +12294,9 @@
           <p:nvPr/>
         </p:nvSpPr>
         <p:spPr>
-          <a:xfrm flipH="1">
-            <a:off x="3219059" y="4590712"/>
-            <a:ext cx="17945882" cy="4534575"/>
+          <a:xfrm>
+            <a:off x="2929749" y="2812473"/>
+            <a:ext cx="18524502" cy="1210588"/>
           </a:xfrm>
           <a:prstGeom prst="rect">
             <a:avLst/>
@@ -11085,7 +12327,7 @@
           </a:bodyPr>
           <a:lstStyle/>
           <a:p>
-            <a:pPr marR="0" algn="l" defTabSz="825500" rtl="0" fontAlgn="auto" latinLnBrk="0" hangingPunct="0">
+            <a:pPr marL="0" marR="0" indent="0" algn="ctr" defTabSz="825500" rtl="0" fontAlgn="auto" latinLnBrk="0" hangingPunct="0">
               <a:lnSpc>
                 <a:spcPct val="100000"/>
               </a:lnSpc>
@@ -11097,6 +12339,8 @@
               </a:spcAft>
               <a:buClrTx/>
               <a:buSzTx/>
+              <a:buFontTx/>
+              <a:buNone/>
               <a:tabLst/>
             </a:pPr>
             <a:r>
@@ -11105,9 +12349,7 @@
                   <a:noFill/>
                 </a:ln>
                 <a:solidFill>
-                  <a:schemeClr val="bg2">
-                    <a:lumMod val="90000"/>
-                  </a:schemeClr>
+                  <a:schemeClr val="bg1"/>
                 </a:solidFill>
                 <a:effectLst/>
                 <a:uFillTx/>
@@ -11116,120 +12358,44 @@
                 <a:cs typeface="Helvetica Neue"/>
                 <a:sym typeface="Helvetica Neue"/>
               </a:rPr>
-              <a:t>Infrared Pyrometers:</a:t>
-            </a:r>
-          </a:p>
-          <a:p>
-            <a:pPr marL="857250" marR="0" indent="-857250" algn="l" defTabSz="825500" rtl="0" fontAlgn="auto" latinLnBrk="0" hangingPunct="0">
-              <a:lnSpc>
-                <a:spcPct val="100000"/>
-              </a:lnSpc>
-              <a:spcBef>
-                <a:spcPts val="0"/>
-              </a:spcBef>
-              <a:spcAft>
-                <a:spcPts val="0"/>
-              </a:spcAft>
-              <a:buClrTx/>
-              <a:buSzTx/>
-              <a:buFont typeface="Arial" panose="020B0604020202020204" pitchFamily="34" charset="0"/>
-              <a:buChar char="•"/>
-              <a:tabLst/>
-            </a:pPr>
-            <a:r>
-              <a:rPr lang="en-US" sz="7200" dirty="0">
-                <a:solidFill>
-                  <a:schemeClr val="bg2">
-                    <a:lumMod val="90000"/>
-                  </a:schemeClr>
-                </a:solidFill>
-              </a:rPr>
-              <a:t>Funnel infrared radiation into detector</a:t>
-            </a:r>
-          </a:p>
-          <a:p>
-            <a:pPr marL="857250" marR="0" indent="-857250" algn="l" defTabSz="825500" rtl="0" fontAlgn="auto" latinLnBrk="0" hangingPunct="0">
-              <a:lnSpc>
-                <a:spcPct val="100000"/>
-              </a:lnSpc>
-              <a:spcBef>
-                <a:spcPts val="0"/>
-              </a:spcBef>
-              <a:spcAft>
-                <a:spcPts val="0"/>
-              </a:spcAft>
-              <a:buClrTx/>
-              <a:buSzTx/>
-              <a:buFont typeface="Arial" panose="020B0604020202020204" pitchFamily="34" charset="0"/>
-              <a:buChar char="•"/>
-              <a:tabLst/>
-            </a:pPr>
-            <a:r>
-              <a:rPr kumimoji="0" lang="en-US" sz="7200" b="1" i="0" u="none" strike="noStrike" cap="none" spc="0" normalizeH="0" baseline="0" dirty="0">
-                <a:ln>
-                  <a:noFill/>
-                </a:ln>
-                <a:solidFill>
-                  <a:schemeClr val="bg2">
-                    <a:lumMod val="90000"/>
-                  </a:schemeClr>
-                </a:solidFill>
-                <a:effectLst/>
-                <a:uFillTx/>
-                <a:latin typeface="Helvetica Neue"/>
-                <a:ea typeface="Helvetica Neue"/>
-                <a:cs typeface="Helvetica Neue"/>
-                <a:sym typeface="Helvetica Neue"/>
-              </a:rPr>
-              <a:t>Measure incoming intensity</a:t>
-            </a:r>
-          </a:p>
-          <a:p>
-            <a:pPr marL="857250" marR="0" indent="-857250" algn="l" defTabSz="825500" rtl="0" fontAlgn="auto" latinLnBrk="0" hangingPunct="0">
-              <a:lnSpc>
-                <a:spcPct val="100000"/>
-              </a:lnSpc>
-              <a:spcBef>
-                <a:spcPts val="0"/>
-              </a:spcBef>
-              <a:spcAft>
-                <a:spcPts val="0"/>
-              </a:spcAft>
-              <a:buClrTx/>
-              <a:buSzTx/>
-              <a:buFont typeface="Arial" panose="020B0604020202020204" pitchFamily="34" charset="0"/>
-              <a:buChar char="•"/>
-              <a:tabLst/>
-            </a:pPr>
-            <a:r>
-              <a:rPr lang="en-US" sz="7200" dirty="0">
-                <a:solidFill>
-                  <a:schemeClr val="bg1"/>
-                </a:solidFill>
-              </a:rPr>
-              <a:t>Calculate temperature</a:t>
-            </a:r>
-            <a:endParaRPr kumimoji="0" lang="en-US" sz="7200" b="1" i="0" u="none" strike="noStrike" cap="none" spc="0" normalizeH="0" baseline="0" dirty="0">
-              <a:ln>
-                <a:noFill/>
-              </a:ln>
-              <a:solidFill>
-                <a:schemeClr val="bg1"/>
-              </a:solidFill>
-              <a:effectLst/>
-              <a:uFillTx/>
-              <a:latin typeface="Helvetica Neue"/>
-              <a:ea typeface="Helvetica Neue"/>
-              <a:cs typeface="Helvetica Neue"/>
-              <a:sym typeface="Helvetica Neue"/>
-            </a:endParaRPr>
+              <a:t>Traditional camera</a:t>
+            </a:r>
+          </a:p>
+        </p:txBody>
+      </p:sp>
+      <p:sp>
+        <p:nvSpPr>
+          <p:cNvPr id="3" name="Slide Number Placeholder 2">
+            <a:extLst>
+              <a:ext uri="{FF2B5EF4-FFF2-40B4-BE49-F238E27FC236}">
+                <a16:creationId xmlns:a16="http://schemas.microsoft.com/office/drawing/2014/main" id="{25CEAF2B-3EA7-C433-55F5-6A553CC8597C}"/>
+              </a:ext>
+            </a:extLst>
+          </p:cNvPr>
+          <p:cNvSpPr>
+            <a:spLocks noGrp="1"/>
+          </p:cNvSpPr>
+          <p:nvPr>
+            <p:ph type="sldNum" sz="quarter" idx="2"/>
+          </p:nvPr>
+        </p:nvSpPr>
+        <p:spPr/>
+        <p:txBody>
+          <a:bodyPr/>
+          <a:lstStyle/>
+          <a:p>
+            <a:fld id="{86CB4B4D-7CA3-9044-876B-883B54F8677D}" type="slidenum">
+              <a:rPr lang="en-US" smtClean="0"/>
+              <a:t>9</a:t>
+            </a:fld>
+            <a:endParaRPr lang="en-US"/>
           </a:p>
         </p:txBody>
       </p:sp>
     </p:spTree>
     <p:extLst>
       <p:ext uri="{BB962C8B-B14F-4D97-AF65-F5344CB8AC3E}">
-        <p14:creationId xmlns:p14="http://schemas.microsoft.com/office/powerpoint/2010/main" val="905101904"/>
+        <p14:creationId xmlns:p14="http://schemas.microsoft.com/office/powerpoint/2010/main" val="424534213"/>
       </p:ext>
     </p:extLst>
   </p:cSld>

</xml_diff>